<commit_message>
Session 1 Presentation updated
</commit_message>
<xml_diff>
--- a/Presentation/soaTrainingPresentation.pptx
+++ b/Presentation/soaTrainingPresentation.pptx
@@ -8,20 +8,21 @@
     <p:sldId id="256" r:id="rId2"/>
     <p:sldId id="279" r:id="rId3"/>
     <p:sldId id="280" r:id="rId4"/>
-    <p:sldId id="281" r:id="rId5"/>
-    <p:sldId id="282" r:id="rId6"/>
-    <p:sldId id="283" r:id="rId7"/>
-    <p:sldId id="284" r:id="rId8"/>
-    <p:sldId id="285" r:id="rId9"/>
-    <p:sldId id="286" r:id="rId10"/>
-    <p:sldId id="287" r:id="rId11"/>
-    <p:sldId id="288" r:id="rId12"/>
-    <p:sldId id="259" r:id="rId13"/>
-    <p:sldId id="276" r:id="rId14"/>
-    <p:sldId id="277" r:id="rId15"/>
-    <p:sldId id="261" r:id="rId16"/>
-    <p:sldId id="268" r:id="rId17"/>
-    <p:sldId id="272" r:id="rId18"/>
+    <p:sldId id="282" r:id="rId5"/>
+    <p:sldId id="283" r:id="rId6"/>
+    <p:sldId id="284" r:id="rId7"/>
+    <p:sldId id="285" r:id="rId8"/>
+    <p:sldId id="286" r:id="rId9"/>
+    <p:sldId id="287" r:id="rId10"/>
+    <p:sldId id="288" r:id="rId11"/>
+    <p:sldId id="281" r:id="rId12"/>
+    <p:sldId id="289" r:id="rId13"/>
+    <p:sldId id="259" r:id="rId14"/>
+    <p:sldId id="276" r:id="rId15"/>
+    <p:sldId id="277" r:id="rId16"/>
+    <p:sldId id="261" r:id="rId17"/>
+    <p:sldId id="268" r:id="rId18"/>
+    <p:sldId id="272" r:id="rId19"/>
   </p:sldIdLst>
   <p:sldSz cx="9144000" cy="6858000" type="screen4x3"/>
   <p:notesSz cx="6858000" cy="9144000"/>
@@ -128,7 +129,6 @@
             <p14:sldId id="256"/>
             <p14:sldId id="279"/>
             <p14:sldId id="280"/>
-            <p14:sldId id="281"/>
             <p14:sldId id="282"/>
             <p14:sldId id="283"/>
             <p14:sldId id="284"/>
@@ -136,6 +136,8 @@
             <p14:sldId id="286"/>
             <p14:sldId id="287"/>
             <p14:sldId id="288"/>
+            <p14:sldId id="281"/>
+            <p14:sldId id="289"/>
           </p14:sldIdLst>
         </p14:section>
         <p14:section name="Architecture" id="{2E54B0A4-7D42-4DA8-B359-3DA8DE410F7E}">
@@ -2606,7 +2608,7 @@
           <p:cNvPr id="2" name="Content Placeholder 1">
             <a:extLst>
               <a:ext uri="{FF2B5EF4-FFF2-40B4-BE49-F238E27FC236}">
-                <a16:creationId xmlns:a16="http://schemas.microsoft.com/office/drawing/2014/main" id="{0542E5A1-B286-C08A-948F-EAEE7AC71D38}"/>
+                <a16:creationId xmlns:a16="http://schemas.microsoft.com/office/drawing/2014/main" id="{5AE0E60C-7619-E86D-CDDE-CE9B020FAC54}"/>
               </a:ext>
             </a:extLst>
           </p:cNvPr>
@@ -2627,138 +2629,204 @@
               <a:buChar char="q"/>
             </a:pPr>
             <a:r>
-              <a:rPr lang="en-US" dirty="0"/>
-              <a:t>ORACLE SOA SCA</a:t>
+              <a:rPr lang="en-US" sz="1500" dirty="0"/>
+              <a:t>The following summarizes the 5 key elements of SCA shown above: </a:t>
             </a:r>
           </a:p>
           <a:p>
             <a:pPr marL="0" indent="0">
               <a:buNone/>
             </a:pPr>
-            <a:endParaRPr lang="en-US" sz="1100" dirty="0"/>
+            <a:endParaRPr lang="en-US" sz="1500" dirty="0"/>
           </a:p>
           <a:p>
             <a:pPr lvl="1">
-              <a:buFont typeface="Arial" panose="020B0604020202020204" pitchFamily="34" charset="0"/>
-              <a:buChar char="•"/>
+              <a:spcAft>
+                <a:spcPts val="1200"/>
+              </a:spcAft>
+              <a:buFont typeface="Wingdings" panose="05000000000000000000" pitchFamily="2" charset="2"/>
+              <a:buChar char="Ø"/>
             </a:pPr>
             <a:r>
-              <a:rPr lang="en-US" sz="1400" dirty="0">
+              <a:rPr lang="en-US" dirty="0">
+                <a:solidFill>
+                  <a:schemeClr val="accent3">
+                    <a:lumMod val="75000"/>
+                  </a:schemeClr>
+                </a:solidFill>
+              </a:rPr>
+              <a:t>Composite</a:t>
+            </a:r>
+            <a:r>
+              <a:rPr lang="en-US" dirty="0"/>
+              <a:t>: </a:t>
+            </a:r>
+            <a:r>
+              <a:rPr lang="en-US" dirty="0">
                 <a:solidFill>
                   <a:srgbClr val="161616"/>
                 </a:solidFill>
                 <a:latin typeface="inherit"/>
               </a:rPr>
-              <a:t>The entry point to the composite itself is the </a:t>
-            </a:r>
-            <a:r>
-              <a:rPr lang="en-US" sz="1400" dirty="0">
-                <a:solidFill>
-                  <a:srgbClr val="00B050"/>
+              <a:t>deployment unit </a:t>
+            </a:r>
+            <a:endParaRPr lang="en-US" dirty="0"/>
+          </a:p>
+          <a:p>
+            <a:pPr lvl="1">
+              <a:spcAft>
+                <a:spcPts val="1200"/>
+              </a:spcAft>
+              <a:buFont typeface="Wingdings" panose="05000000000000000000" pitchFamily="2" charset="2"/>
+              <a:buChar char="Ø"/>
+            </a:pPr>
+            <a:r>
+              <a:rPr lang="en-US" dirty="0">
+                <a:solidFill>
+                  <a:schemeClr val="accent3">
+                    <a:lumMod val="75000"/>
+                  </a:schemeClr>
+                </a:solidFill>
+              </a:rPr>
+              <a:t>Service</a:t>
+            </a:r>
+            <a:r>
+              <a:rPr lang="en-US" dirty="0"/>
+              <a:t>: </a:t>
+            </a:r>
+            <a:r>
+              <a:rPr lang="en-US" dirty="0">
+                <a:solidFill>
+                  <a:srgbClr val="161616"/>
                 </a:solidFill>
                 <a:latin typeface="inherit"/>
               </a:rPr>
-              <a:t>Service</a:t>
-            </a:r>
-            <a:r>
-              <a:rPr lang="en-US" sz="1400" dirty="0">
+              <a:t>entry-point into the composite. Services exposed by the component that are callable from outside the composite are called promoted services</a:t>
+            </a:r>
+          </a:p>
+          <a:p>
+            <a:pPr lvl="1">
+              <a:spcAft>
+                <a:spcPts val="1200"/>
+              </a:spcAft>
+              <a:buFont typeface="Wingdings" panose="05000000000000000000" pitchFamily="2" charset="2"/>
+              <a:buChar char="Ø"/>
+            </a:pPr>
+            <a:r>
+              <a:rPr lang="en-US" dirty="0">
+                <a:solidFill>
+                  <a:schemeClr val="accent3">
+                    <a:lumMod val="75000"/>
+                  </a:schemeClr>
+                </a:solidFill>
+              </a:rPr>
+              <a:t>Component</a:t>
+            </a:r>
+            <a:r>
+              <a:rPr lang="en-US" dirty="0">
                 <a:solidFill>
                   <a:srgbClr val="161616"/>
                 </a:solidFill>
                 <a:latin typeface="inherit"/>
               </a:rPr>
-              <a:t> which exposes a chain of one or more components (each with its own Service interface) that are bound/linked together as dependencies (known as </a:t>
-            </a:r>
-            <a:r>
-              <a:rPr lang="en-US" sz="1400" dirty="0">
-                <a:solidFill>
-                  <a:srgbClr val="00B050"/>
+              <a:t>: provides the logic to be used within the composite</a:t>
+            </a:r>
+          </a:p>
+          <a:p>
+            <a:pPr lvl="1">
+              <a:spcAft>
+                <a:spcPts val="1200"/>
+              </a:spcAft>
+              <a:buFont typeface="Wingdings" panose="05000000000000000000" pitchFamily="2" charset="2"/>
+              <a:buChar char="Ø"/>
+            </a:pPr>
+            <a:r>
+              <a:rPr lang="en-US" dirty="0">
+                <a:solidFill>
+                  <a:schemeClr val="accent3">
+                    <a:lumMod val="75000"/>
+                  </a:schemeClr>
+                </a:solidFill>
+              </a:rPr>
+              <a:t>Reference:</a:t>
+            </a:r>
+            <a:r>
+              <a:rPr lang="en-US" dirty="0"/>
+              <a:t> </a:t>
+            </a:r>
+            <a:r>
+              <a:rPr lang="en-US" dirty="0">
+                <a:solidFill>
+                  <a:srgbClr val="161616"/>
                 </a:solidFill>
                 <a:latin typeface="inherit"/>
               </a:rPr>
-              <a:t>References</a:t>
-            </a:r>
-            <a:r>
-              <a:rPr lang="en-US" sz="1400" dirty="0">
+              <a:t>refers to internal and external services. As per the SCA spec, references to external services are called “promoted references”</a:t>
+            </a:r>
+          </a:p>
+          <a:p>
+            <a:pPr lvl="1">
+              <a:spcAft>
+                <a:spcPts val="1200"/>
+              </a:spcAft>
+              <a:buFont typeface="Wingdings" panose="05000000000000000000" pitchFamily="2" charset="2"/>
+              <a:buChar char="Ø"/>
+            </a:pPr>
+            <a:r>
+              <a:rPr lang="en-US" dirty="0">
+                <a:solidFill>
+                  <a:schemeClr val="accent3">
+                    <a:lumMod val="75000"/>
+                  </a:schemeClr>
+                </a:solidFill>
+              </a:rPr>
+              <a:t>Wire:</a:t>
+            </a:r>
+            <a:r>
+              <a:rPr lang="en-US" dirty="0"/>
+              <a:t> </a:t>
+            </a:r>
+            <a:r>
+              <a:rPr lang="en-US" dirty="0">
                 <a:solidFill>
                   <a:srgbClr val="161616"/>
                 </a:solidFill>
                 <a:latin typeface="inherit"/>
               </a:rPr>
-              <a:t>) through </a:t>
-            </a:r>
-            <a:r>
-              <a:rPr lang="en-US" sz="1400" dirty="0">
-                <a:solidFill>
-                  <a:srgbClr val="00B050"/>
+              <a:t>connects services, components and references – no special semantic.</a:t>
+            </a:r>
+          </a:p>
+          <a:p>
+            <a:pPr lvl="1">
+              <a:spcAft>
+                <a:spcPts val="1200"/>
+              </a:spcAft>
+              <a:buFont typeface="Wingdings" panose="05000000000000000000" pitchFamily="2" charset="2"/>
+              <a:buChar char="Ø"/>
+            </a:pPr>
+            <a:r>
+              <a:rPr lang="en-US" dirty="0">
+                <a:solidFill>
+                  <a:schemeClr val="accent3">
+                    <a:lumMod val="75000"/>
+                  </a:schemeClr>
+                </a:solidFill>
+              </a:rPr>
+              <a:t>Properties:</a:t>
+            </a:r>
+            <a:r>
+              <a:rPr lang="en-US" dirty="0"/>
+              <a:t> </a:t>
+            </a:r>
+            <a:r>
+              <a:rPr lang="en-US" dirty="0">
+                <a:solidFill>
+                  <a:srgbClr val="161616"/>
                 </a:solidFill>
                 <a:latin typeface="inherit"/>
               </a:rPr>
-              <a:t>Wires</a:t>
-            </a:r>
-            <a:r>
-              <a:rPr lang="en-US" sz="1400" dirty="0">
-                <a:solidFill>
-                  <a:srgbClr val="161616"/>
-                </a:solidFill>
-                <a:latin typeface="inherit"/>
-              </a:rPr>
-              <a:t>. </a:t>
-            </a:r>
-          </a:p>
-          <a:p>
-            <a:pPr lvl="1">
-              <a:buFont typeface="Arial" panose="020B0604020202020204" pitchFamily="34" charset="0"/>
-              <a:buChar char="•"/>
-            </a:pPr>
-            <a:r>
-              <a:rPr lang="en-US" sz="1400" dirty="0">
-                <a:solidFill>
-                  <a:srgbClr val="161616"/>
-                </a:solidFill>
-                <a:latin typeface="inherit"/>
-              </a:rPr>
-              <a:t>The components can be local (such as a BPEL process or JCA adapter) or they can be remote using a protocol such as Web services. </a:t>
-            </a:r>
-          </a:p>
-          <a:p>
-            <a:pPr lvl="1">
-              <a:buFont typeface="Arial" panose="020B0604020202020204" pitchFamily="34" charset="0"/>
-              <a:buChar char="•"/>
-            </a:pPr>
-            <a:r>
-              <a:rPr lang="en-US" sz="1400" dirty="0">
-                <a:solidFill>
-                  <a:srgbClr val="161616"/>
-                </a:solidFill>
-                <a:latin typeface="inherit"/>
-              </a:rPr>
-              <a:t>Finally, the specification allows for each of the components to have properties for customization within a particular use or deployment (e.g. the directory to which a completed Purchase Order document should be written).</a:t>
-            </a:r>
-          </a:p>
-          <a:p>
-            <a:pPr lvl="1">
-              <a:buFont typeface="Arial" panose="020B0604020202020204" pitchFamily="34" charset="0"/>
-              <a:buChar char="•"/>
-            </a:pPr>
-            <a:endParaRPr lang="en-US" sz="1400" dirty="0">
-              <a:solidFill>
-                <a:srgbClr val="161616"/>
-              </a:solidFill>
-              <a:latin typeface="inherit"/>
-            </a:endParaRPr>
-          </a:p>
-          <a:p>
-            <a:pPr lvl="1">
-              <a:buFont typeface="Arial" panose="020B0604020202020204" pitchFamily="34" charset="0"/>
-              <a:buChar char="•"/>
-            </a:pPr>
-            <a:endParaRPr lang="en-US" sz="1400" dirty="0">
-              <a:solidFill>
-                <a:srgbClr val="161616"/>
-              </a:solidFill>
-              <a:latin typeface="inherit"/>
-            </a:endParaRPr>
+              <a:t>allow for customization of a component’s behavior in a particular deployment</a:t>
+            </a:r>
           </a:p>
         </p:txBody>
       </p:sp>
@@ -2767,7 +2835,7 @@
           <p:cNvPr id="3" name="Title 2">
             <a:extLst>
               <a:ext uri="{FF2B5EF4-FFF2-40B4-BE49-F238E27FC236}">
-                <a16:creationId xmlns:a16="http://schemas.microsoft.com/office/drawing/2014/main" id="{4C026758-6EB5-2BD2-2F2E-6132759AA3B5}"/>
+                <a16:creationId xmlns:a16="http://schemas.microsoft.com/office/drawing/2014/main" id="{1D51FB4E-40B1-A033-CDAB-47EF3F47B8A0}"/>
               </a:ext>
             </a:extLst>
           </p:cNvPr>
@@ -2816,70 +2884,10 @@
           </a:p>
         </p:txBody>
       </p:sp>
-      <p:pic>
-        <p:nvPicPr>
-          <p:cNvPr id="5" name="Picture 4">
-            <a:extLst>
-              <a:ext uri="{FF2B5EF4-FFF2-40B4-BE49-F238E27FC236}">
-                <a16:creationId xmlns:a16="http://schemas.microsoft.com/office/drawing/2014/main" id="{A0E7569D-F024-74C0-6C41-D880A6C2907A}"/>
-              </a:ext>
-            </a:extLst>
-          </p:cNvPr>
-          <p:cNvPicPr>
-            <a:picLocks noChangeAspect="1"/>
-          </p:cNvPicPr>
-          <p:nvPr/>
-        </p:nvPicPr>
-        <p:blipFill>
-          <a:blip r:embed="rId2"/>
-          <a:stretch>
-            <a:fillRect/>
-          </a:stretch>
-        </p:blipFill>
-        <p:spPr>
-          <a:xfrm>
-            <a:off x="625816" y="3672686"/>
-            <a:ext cx="3279134" cy="2422954"/>
-          </a:xfrm>
-          <a:prstGeom prst="rect">
-            <a:avLst/>
-          </a:prstGeom>
-        </p:spPr>
-      </p:pic>
-      <p:pic>
-        <p:nvPicPr>
-          <p:cNvPr id="7" name="Picture 6">
-            <a:extLst>
-              <a:ext uri="{FF2B5EF4-FFF2-40B4-BE49-F238E27FC236}">
-                <a16:creationId xmlns:a16="http://schemas.microsoft.com/office/drawing/2014/main" id="{B88A8CE2-46E4-C98C-A654-B6D4CAD56CF9}"/>
-              </a:ext>
-            </a:extLst>
-          </p:cNvPr>
-          <p:cNvPicPr>
-            <a:picLocks noChangeAspect="1"/>
-          </p:cNvPicPr>
-          <p:nvPr/>
-        </p:nvPicPr>
-        <p:blipFill>
-          <a:blip r:embed="rId3"/>
-          <a:stretch>
-            <a:fillRect/>
-          </a:stretch>
-        </p:blipFill>
-        <p:spPr>
-          <a:xfrm>
-            <a:off x="4073566" y="4013961"/>
-            <a:ext cx="4396487" cy="1740403"/>
-          </a:xfrm>
-          <a:prstGeom prst="rect">
-            <a:avLst/>
-          </a:prstGeom>
-        </p:spPr>
-      </p:pic>
     </p:spTree>
     <p:extLst>
       <p:ext uri="{BB962C8B-B14F-4D97-AF65-F5344CB8AC3E}">
-        <p14:creationId xmlns:p14="http://schemas.microsoft.com/office/powerpoint/2010/main" val="3505989978"/>
+        <p14:creationId xmlns:p14="http://schemas.microsoft.com/office/powerpoint/2010/main" val="2266756794"/>
       </p:ext>
     </p:extLst>
   </p:cSld>
@@ -2911,7 +2919,7 @@
           <p:cNvPr id="2" name="Content Placeholder 1">
             <a:extLst>
               <a:ext uri="{FF2B5EF4-FFF2-40B4-BE49-F238E27FC236}">
-                <a16:creationId xmlns:a16="http://schemas.microsoft.com/office/drawing/2014/main" id="{5AE0E60C-7619-E86D-CDDE-CE9B020FAC54}"/>
+                <a16:creationId xmlns:a16="http://schemas.microsoft.com/office/drawing/2014/main" id="{EBB35BBA-4A6A-DC4A-222E-5217FAF04C32}"/>
               </a:ext>
             </a:extLst>
           </p:cNvPr>
@@ -2922,207 +2930,19 @@
             <p:ph idx="1"/>
           </p:nvPr>
         </p:nvSpPr>
-        <p:spPr/>
+        <p:spPr>
+          <a:xfrm>
+            <a:off x="304800" y="922178"/>
+            <a:ext cx="8229600" cy="4906963"/>
+          </a:xfrm>
+        </p:spPr>
         <p:txBody>
           <a:bodyPr/>
           <a:lstStyle/>
           <a:p>
-            <a:pPr>
-              <a:buFont typeface="Wingdings" panose="05000000000000000000" pitchFamily="2" charset="2"/>
-              <a:buChar char="q"/>
-            </a:pPr>
-            <a:r>
-              <a:rPr lang="en-US" sz="1500" dirty="0"/>
-              <a:t>The following summarizes the 5 key elements of SCA shown above: </a:t>
-            </a:r>
-          </a:p>
-          <a:p>
-            <a:pPr lvl="1">
-              <a:spcAft>
-                <a:spcPts val="600"/>
-              </a:spcAft>
-              <a:buFont typeface="Wingdings" panose="05000000000000000000" pitchFamily="2" charset="2"/>
-              <a:buChar char="Ø"/>
-            </a:pPr>
-            <a:r>
-              <a:rPr lang="en-US" dirty="0">
-                <a:solidFill>
-                  <a:schemeClr val="accent3">
-                    <a:lumMod val="75000"/>
-                  </a:schemeClr>
-                </a:solidFill>
-              </a:rPr>
-              <a:t>Composite</a:t>
-            </a:r>
             <a:r>
               <a:rPr lang="en-US" dirty="0"/>
-              <a:t>: </a:t>
-            </a:r>
-            <a:r>
-              <a:rPr lang="en-US" dirty="0">
-                <a:solidFill>
-                  <a:srgbClr val="161616"/>
-                </a:solidFill>
-                <a:latin typeface="inherit"/>
-              </a:rPr>
-              <a:t>deployment unit </a:t>
-            </a:r>
-            <a:endParaRPr lang="en-US" dirty="0"/>
-          </a:p>
-          <a:p>
-            <a:pPr lvl="1">
-              <a:spcAft>
-                <a:spcPts val="600"/>
-              </a:spcAft>
-              <a:buFont typeface="Wingdings" panose="05000000000000000000" pitchFamily="2" charset="2"/>
-              <a:buChar char="Ø"/>
-            </a:pPr>
-            <a:r>
-              <a:rPr lang="en-US" dirty="0">
-                <a:solidFill>
-                  <a:schemeClr val="accent3">
-                    <a:lumMod val="75000"/>
-                  </a:schemeClr>
-                </a:solidFill>
-              </a:rPr>
-              <a:t>Service</a:t>
-            </a:r>
-            <a:r>
-              <a:rPr lang="en-US" dirty="0"/>
-              <a:t>: </a:t>
-            </a:r>
-            <a:r>
-              <a:rPr lang="en-US" dirty="0">
-                <a:solidFill>
-                  <a:srgbClr val="161616"/>
-                </a:solidFill>
-                <a:latin typeface="inherit"/>
-              </a:rPr>
-              <a:t>entry-point into the composite. Services exposed by the component that are callable from outside the composite are called promoted services</a:t>
-            </a:r>
-          </a:p>
-          <a:p>
-            <a:pPr lvl="1">
-              <a:spcAft>
-                <a:spcPts val="600"/>
-              </a:spcAft>
-              <a:buFont typeface="Wingdings" panose="05000000000000000000" pitchFamily="2" charset="2"/>
-              <a:buChar char="Ø"/>
-            </a:pPr>
-            <a:r>
-              <a:rPr lang="en-US" dirty="0">
-                <a:solidFill>
-                  <a:schemeClr val="accent3">
-                    <a:lumMod val="75000"/>
-                  </a:schemeClr>
-                </a:solidFill>
-              </a:rPr>
-              <a:t>Component</a:t>
-            </a:r>
-            <a:r>
-              <a:rPr lang="en-US" dirty="0">
-                <a:solidFill>
-                  <a:srgbClr val="161616"/>
-                </a:solidFill>
-                <a:latin typeface="inherit"/>
-              </a:rPr>
-              <a:t>: provides the logic to be used within the composite</a:t>
-            </a:r>
-          </a:p>
-          <a:p>
-            <a:pPr lvl="1">
-              <a:spcAft>
-                <a:spcPts val="600"/>
-              </a:spcAft>
-              <a:buFont typeface="Wingdings" panose="05000000000000000000" pitchFamily="2" charset="2"/>
-              <a:buChar char="Ø"/>
-            </a:pPr>
-            <a:r>
-              <a:rPr lang="en-US" dirty="0">
-                <a:solidFill>
-                  <a:schemeClr val="accent3">
-                    <a:lumMod val="75000"/>
-                  </a:schemeClr>
-                </a:solidFill>
-              </a:rPr>
-              <a:t>Reference:</a:t>
-            </a:r>
-            <a:r>
-              <a:rPr lang="en-US" dirty="0"/>
-              <a:t> </a:t>
-            </a:r>
-            <a:r>
-              <a:rPr lang="en-US" dirty="0">
-                <a:solidFill>
-                  <a:srgbClr val="161616"/>
-                </a:solidFill>
-                <a:latin typeface="inherit"/>
-              </a:rPr>
-              <a:t>refers to internal and external services. As per the SCA spec, references to external services are called “promoted references”</a:t>
-            </a:r>
-          </a:p>
-          <a:p>
-            <a:pPr lvl="1">
-              <a:spcAft>
-                <a:spcPts val="600"/>
-              </a:spcAft>
-              <a:buFont typeface="Wingdings" panose="05000000000000000000" pitchFamily="2" charset="2"/>
-              <a:buChar char="Ø"/>
-            </a:pPr>
-            <a:r>
-              <a:rPr lang="en-US" dirty="0">
-                <a:solidFill>
-                  <a:schemeClr val="accent3">
-                    <a:lumMod val="75000"/>
-                  </a:schemeClr>
-                </a:solidFill>
-              </a:rPr>
-              <a:t>Wire:</a:t>
-            </a:r>
-            <a:r>
-              <a:rPr lang="en-US" dirty="0"/>
-              <a:t> </a:t>
-            </a:r>
-            <a:r>
-              <a:rPr lang="en-US" dirty="0">
-                <a:solidFill>
-                  <a:srgbClr val="161616"/>
-                </a:solidFill>
-                <a:latin typeface="inherit"/>
-              </a:rPr>
-              <a:t>connects services, components and references – no special semantic.</a:t>
-            </a:r>
-          </a:p>
-          <a:p>
-            <a:pPr lvl="1">
-              <a:spcAft>
-                <a:spcPts val="600"/>
-              </a:spcAft>
-              <a:buFont typeface="Wingdings" panose="05000000000000000000" pitchFamily="2" charset="2"/>
-              <a:buChar char="Ø"/>
-            </a:pPr>
-            <a:r>
-              <a:rPr lang="en-US" dirty="0">
-                <a:solidFill>
-                  <a:schemeClr val="accent3">
-                    <a:lumMod val="75000"/>
-                  </a:schemeClr>
-                </a:solidFill>
-              </a:rPr>
-              <a:t>Properties:</a:t>
-            </a:r>
-            <a:r>
-              <a:rPr lang="en-US" dirty="0"/>
-              <a:t> </a:t>
-            </a:r>
-            <a:r>
-              <a:rPr lang="en-US" dirty="0">
-                <a:solidFill>
-                  <a:srgbClr val="161616"/>
-                </a:solidFill>
-                <a:latin typeface="inherit"/>
-              </a:rPr>
-              <a:t>allow for customization of a component’s behavior in a particular deployment</a:t>
+              <a:t>Some of Oracle SOA Components</a:t>
             </a:r>
           </a:p>
         </p:txBody>
@@ -3132,7 +2952,7 @@
           <p:cNvPr id="3" name="Title 2">
             <a:extLst>
               <a:ext uri="{FF2B5EF4-FFF2-40B4-BE49-F238E27FC236}">
-                <a16:creationId xmlns:a16="http://schemas.microsoft.com/office/drawing/2014/main" id="{1D51FB4E-40B1-A033-CDAB-47EF3F47B8A0}"/>
+                <a16:creationId xmlns:a16="http://schemas.microsoft.com/office/drawing/2014/main" id="{1EE94271-6AC1-62AE-3B8C-DBF5C6B5F87D}"/>
               </a:ext>
             </a:extLst>
           </p:cNvPr>
@@ -3181,10 +3001,328 @@
           </a:p>
         </p:txBody>
       </p:sp>
+      <p:sp>
+        <p:nvSpPr>
+          <p:cNvPr id="6" name="TextBox 5">
+            <a:extLst>
+              <a:ext uri="{FF2B5EF4-FFF2-40B4-BE49-F238E27FC236}">
+                <a16:creationId xmlns:a16="http://schemas.microsoft.com/office/drawing/2014/main" id="{609DE738-DC89-84AB-9C81-3760EFCE5BBD}"/>
+              </a:ext>
+            </a:extLst>
+          </p:cNvPr>
+          <p:cNvSpPr txBox="1"/>
+          <p:nvPr/>
+        </p:nvSpPr>
+        <p:spPr>
+          <a:xfrm>
+            <a:off x="445251" y="1397680"/>
+            <a:ext cx="7383780" cy="830997"/>
+          </a:xfrm>
+          <a:prstGeom prst="rect">
+            <a:avLst/>
+          </a:prstGeom>
+          <a:noFill/>
+        </p:spPr>
+        <p:txBody>
+          <a:bodyPr wrap="square">
+            <a:spAutoFit/>
+          </a:bodyPr>
+          <a:lstStyle/>
+          <a:p>
+            <a:pPr marL="285750" indent="-285750" algn="l">
+              <a:buFont typeface="Wingdings" panose="05000000000000000000" pitchFamily="2" charset="2"/>
+              <a:buChar char="q"/>
+            </a:pPr>
+            <a:r>
+              <a:rPr lang="en-US" b="1" i="0" dirty="0">
+                <a:solidFill>
+                  <a:srgbClr val="292929"/>
+                </a:solidFill>
+                <a:effectLst/>
+                <a:latin typeface="sohne"/>
+              </a:rPr>
+              <a:t>Service Infrastructure</a:t>
+            </a:r>
+          </a:p>
+          <a:p>
+            <a:pPr lvl="1"/>
+            <a:r>
+              <a:rPr lang="en-US" sz="1500" dirty="0">
+                <a:solidFill>
+                  <a:srgbClr val="333333"/>
+                </a:solidFill>
+                <a:latin typeface="AmazonEmber"/>
+              </a:rPr>
+              <a:t>Service Infra allows the linking of components via the internal message routing structure. Along with this, it allows the data flow.</a:t>
+            </a:r>
+          </a:p>
+        </p:txBody>
+      </p:sp>
+      <p:sp>
+        <p:nvSpPr>
+          <p:cNvPr id="10" name="TextBox 9">
+            <a:extLst>
+              <a:ext uri="{FF2B5EF4-FFF2-40B4-BE49-F238E27FC236}">
+                <a16:creationId xmlns:a16="http://schemas.microsoft.com/office/drawing/2014/main" id="{0D76DD70-7C17-8608-45E4-E528835BA7A5}"/>
+              </a:ext>
+            </a:extLst>
+          </p:cNvPr>
+          <p:cNvSpPr txBox="1"/>
+          <p:nvPr/>
+        </p:nvSpPr>
+        <p:spPr>
+          <a:xfrm>
+            <a:off x="445251" y="2339743"/>
+            <a:ext cx="6996197" cy="3370153"/>
+          </a:xfrm>
+          <a:prstGeom prst="rect">
+            <a:avLst/>
+          </a:prstGeom>
+          <a:noFill/>
+        </p:spPr>
+        <p:txBody>
+          <a:bodyPr wrap="square">
+            <a:spAutoFit/>
+          </a:bodyPr>
+          <a:lstStyle/>
+          <a:p>
+            <a:pPr marL="285750" indent="-285750" algn="l">
+              <a:buFont typeface="Wingdings" panose="05000000000000000000" pitchFamily="2" charset="2"/>
+              <a:buChar char="q"/>
+            </a:pPr>
+            <a:r>
+              <a:rPr lang="en-US" b="1" i="0" dirty="0">
+                <a:solidFill>
+                  <a:srgbClr val="292929"/>
+                </a:solidFill>
+                <a:effectLst/>
+                <a:latin typeface="sohne"/>
+              </a:rPr>
+              <a:t>Oracle Adapters:</a:t>
+            </a:r>
+          </a:p>
+          <a:p>
+            <a:pPr marL="742950" lvl="1" indent="-285750">
+              <a:buFont typeface="Arial" panose="020B0604020202020204" pitchFamily="34" charset="0"/>
+              <a:buChar char="•"/>
+            </a:pPr>
+            <a:r>
+              <a:rPr lang="en-US" sz="1500" dirty="0">
+                <a:solidFill>
+                  <a:srgbClr val="333333"/>
+                </a:solidFill>
+                <a:latin typeface="AmazonEmber"/>
+              </a:rPr>
+              <a:t>Services are often surfaced through adapters that take an existing piece of functionality and "adapt" it to the SOA </a:t>
+            </a:r>
+            <a:r>
+              <a:rPr lang="en-US" sz="1500" dirty="0" err="1">
+                <a:solidFill>
+                  <a:srgbClr val="333333"/>
+                </a:solidFill>
+                <a:latin typeface="AmazonEmber"/>
+              </a:rPr>
+              <a:t>world,The</a:t>
+            </a:r>
+            <a:r>
+              <a:rPr lang="en-US" sz="1500" dirty="0">
+                <a:solidFill>
+                  <a:srgbClr val="333333"/>
+                </a:solidFill>
+                <a:latin typeface="AmazonEmber"/>
+              </a:rPr>
+              <a:t> Oracle Adapters uses the JCA technology to establish a link between the Oracle SOA Suite and the external systems. </a:t>
+            </a:r>
+          </a:p>
+          <a:p>
+            <a:pPr marL="742950" lvl="1" indent="-285750">
+              <a:buFont typeface="Arial" panose="020B0604020202020204" pitchFamily="34" charset="0"/>
+              <a:buChar char="•"/>
+            </a:pPr>
+            <a:r>
+              <a:rPr lang="en-US" sz="1500" dirty="0">
+                <a:solidFill>
+                  <a:srgbClr val="333333"/>
+                </a:solidFill>
+                <a:latin typeface="AmazonEmber"/>
+              </a:rPr>
+              <a:t>Out of the box, the SOA Suite includes licenses for the following adapters: </a:t>
+            </a:r>
+          </a:p>
+          <a:p>
+            <a:pPr marL="1200150" lvl="2" indent="-285750">
+              <a:buFont typeface="Courier New" panose="02070309020205020404" pitchFamily="49" charset="0"/>
+              <a:buChar char="o"/>
+            </a:pPr>
+            <a:r>
+              <a:rPr lang="en-US" sz="1500" dirty="0">
+                <a:solidFill>
+                  <a:srgbClr val="333333"/>
+                </a:solidFill>
+                <a:latin typeface="AmazonEmber"/>
+              </a:rPr>
+              <a:t>File adapter </a:t>
+            </a:r>
+          </a:p>
+          <a:p>
+            <a:pPr marL="1200150" lvl="2" indent="-285750">
+              <a:buFont typeface="Courier New" panose="02070309020205020404" pitchFamily="49" charset="0"/>
+              <a:buChar char="o"/>
+            </a:pPr>
+            <a:r>
+              <a:rPr lang="en-US" sz="1500" dirty="0">
+                <a:solidFill>
+                  <a:srgbClr val="333333"/>
+                </a:solidFill>
+                <a:latin typeface="AmazonEmber"/>
+              </a:rPr>
+              <a:t>FTP adapter </a:t>
+            </a:r>
+          </a:p>
+          <a:p>
+            <a:pPr marL="1200150" lvl="2" indent="-285750">
+              <a:buFont typeface="Courier New" panose="02070309020205020404" pitchFamily="49" charset="0"/>
+              <a:buChar char="o"/>
+            </a:pPr>
+            <a:r>
+              <a:rPr lang="en-US" sz="1500" dirty="0">
+                <a:solidFill>
+                  <a:srgbClr val="333333"/>
+                </a:solidFill>
+                <a:latin typeface="AmazonEmber"/>
+              </a:rPr>
+              <a:t>Database adapter </a:t>
+            </a:r>
+          </a:p>
+          <a:p>
+            <a:pPr marL="1200150" lvl="2" indent="-285750">
+              <a:buFont typeface="Courier New" panose="02070309020205020404" pitchFamily="49" charset="0"/>
+              <a:buChar char="o"/>
+            </a:pPr>
+            <a:r>
+              <a:rPr lang="en-US" sz="1500" dirty="0">
+                <a:solidFill>
+                  <a:srgbClr val="333333"/>
+                </a:solidFill>
+                <a:latin typeface="AmazonEmber"/>
+              </a:rPr>
+              <a:t>JMS adapter </a:t>
+            </a:r>
+          </a:p>
+          <a:p>
+            <a:pPr marL="1200150" lvl="2" indent="-285750">
+              <a:buFont typeface="Courier New" panose="02070309020205020404" pitchFamily="49" charset="0"/>
+              <a:buChar char="o"/>
+            </a:pPr>
+            <a:r>
+              <a:rPr lang="en-US" sz="1500" dirty="0">
+                <a:solidFill>
+                  <a:srgbClr val="333333"/>
+                </a:solidFill>
+                <a:latin typeface="AmazonEmber"/>
+              </a:rPr>
+              <a:t>MQ adapter </a:t>
+            </a:r>
+          </a:p>
+          <a:p>
+            <a:pPr marL="1200150" lvl="2" indent="-285750">
+              <a:buFont typeface="Courier New" panose="02070309020205020404" pitchFamily="49" charset="0"/>
+              <a:buChar char="o"/>
+            </a:pPr>
+            <a:r>
+              <a:rPr lang="en-US" sz="1500" dirty="0">
+                <a:solidFill>
+                  <a:srgbClr val="333333"/>
+                </a:solidFill>
+                <a:latin typeface="AmazonEmber"/>
+              </a:rPr>
+              <a:t>AQ adapter </a:t>
+            </a:r>
+          </a:p>
+          <a:p>
+            <a:pPr marL="1200150" lvl="2" indent="-285750">
+              <a:buFont typeface="Courier New" panose="02070309020205020404" pitchFamily="49" charset="0"/>
+              <a:buChar char="o"/>
+            </a:pPr>
+            <a:r>
+              <a:rPr lang="en-US" sz="1500" dirty="0">
+                <a:solidFill>
+                  <a:srgbClr val="333333"/>
+                </a:solidFill>
+                <a:latin typeface="AmazonEmber"/>
+              </a:rPr>
+              <a:t>Socket adapter </a:t>
+            </a:r>
+          </a:p>
+          <a:p>
+            <a:pPr marL="1200150" lvl="2" indent="-285750">
+              <a:buFont typeface="Courier New" panose="02070309020205020404" pitchFamily="49" charset="0"/>
+              <a:buChar char="o"/>
+            </a:pPr>
+            <a:r>
+              <a:rPr lang="en-US" sz="1500" dirty="0">
+                <a:solidFill>
+                  <a:srgbClr val="333333"/>
+                </a:solidFill>
+                <a:latin typeface="AmazonEmber"/>
+              </a:rPr>
+              <a:t>BAM adapter</a:t>
+            </a:r>
+          </a:p>
+        </p:txBody>
+      </p:sp>
+      <p:pic>
+        <p:nvPicPr>
+          <p:cNvPr id="4" name="Picture 2" descr="Illustration showing the Service Infrastructure. It depicts the Service Infrastructure in a box, with the various components connecting to it. It shows it receiving messages from a SOAP binding component and the delivery API. It shows a composite application within the Service Infrastructure.">
+            <a:extLst>
+              <a:ext uri="{FF2B5EF4-FFF2-40B4-BE49-F238E27FC236}">
+                <a16:creationId xmlns:a16="http://schemas.microsoft.com/office/drawing/2014/main" id="{EFC16E13-A22E-9A79-C510-DDC59093DA30}"/>
+              </a:ext>
+            </a:extLst>
+          </p:cNvPr>
+          <p:cNvPicPr>
+            <a:picLocks noChangeAspect="1" noChangeArrowheads="1"/>
+          </p:cNvPicPr>
+          <p:nvPr/>
+        </p:nvPicPr>
+        <p:blipFill>
+          <a:blip r:embed="rId2">
+            <a:alphaModFix amt="85000"/>
+            <a:extLst>
+              <a:ext uri="{28A0092B-C50C-407E-A947-70E740481C1C}">
+                <a14:useLocalDpi xmlns:a14="http://schemas.microsoft.com/office/drawing/2010/main" val="0"/>
+              </a:ext>
+            </a:extLst>
+          </a:blip>
+          <a:srcRect/>
+          <a:stretch>
+            <a:fillRect/>
+          </a:stretch>
+        </p:blipFill>
+        <p:spPr bwMode="auto">
+          <a:xfrm>
+            <a:off x="3986968" y="4024819"/>
+            <a:ext cx="4852232" cy="2273259"/>
+          </a:xfrm>
+          <a:prstGeom prst="rect">
+            <a:avLst/>
+          </a:prstGeom>
+          <a:noFill/>
+          <a:extLst>
+            <a:ext uri="{909E8E84-426E-40DD-AFC4-6F175D3DCCD1}">
+              <a14:hiddenFill xmlns:a14="http://schemas.microsoft.com/office/drawing/2010/main">
+                <a:solidFill>
+                  <a:srgbClr val="FFFFFF"/>
+                </a:solidFill>
+              </a14:hiddenFill>
+            </a:ext>
+          </a:extLst>
+        </p:spPr>
+      </p:pic>
     </p:spTree>
     <p:extLst>
       <p:ext uri="{BB962C8B-B14F-4D97-AF65-F5344CB8AC3E}">
-        <p14:creationId xmlns:p14="http://schemas.microsoft.com/office/powerpoint/2010/main" val="2266756794"/>
+        <p14:creationId xmlns:p14="http://schemas.microsoft.com/office/powerpoint/2010/main" val="171805125"/>
       </p:ext>
     </p:extLst>
   </p:cSld>
@@ -3195,6 +3333,194 @@
 </file>
 
 <file path=ppt/slides/slide12.xml><?xml version="1.0" encoding="utf-8"?>
+<p:sld xmlns:a="http://schemas.openxmlformats.org/drawingml/2006/main" xmlns:r="http://schemas.openxmlformats.org/officeDocument/2006/relationships" xmlns:p="http://schemas.openxmlformats.org/presentationml/2006/main">
+  <p:cSld>
+    <p:spTree>
+      <p:nvGrpSpPr>
+        <p:cNvPr id="1" name=""/>
+        <p:cNvGrpSpPr/>
+        <p:nvPr/>
+      </p:nvGrpSpPr>
+      <p:grpSpPr>
+        <a:xfrm>
+          <a:off x="0" y="0"/>
+          <a:ext cx="0" cy="0"/>
+          <a:chOff x="0" y="0"/>
+          <a:chExt cx="0" cy="0"/>
+        </a:xfrm>
+      </p:grpSpPr>
+      <p:sp>
+        <p:nvSpPr>
+          <p:cNvPr id="3" name="Title 2">
+            <a:extLst>
+              <a:ext uri="{FF2B5EF4-FFF2-40B4-BE49-F238E27FC236}">
+                <a16:creationId xmlns:a16="http://schemas.microsoft.com/office/drawing/2014/main" id="{E2EFA5C5-F89D-9268-6ED9-EB9C8C67C850}"/>
+              </a:ext>
+            </a:extLst>
+          </p:cNvPr>
+          <p:cNvSpPr>
+            <a:spLocks noGrp="1"/>
+          </p:cNvSpPr>
+          <p:nvPr>
+            <p:ph type="title"/>
+          </p:nvPr>
+        </p:nvSpPr>
+        <p:spPr/>
+        <p:txBody>
+          <a:bodyPr/>
+          <a:lstStyle/>
+          <a:p>
+            <a:endParaRPr lang="en-US"/>
+          </a:p>
+        </p:txBody>
+      </p:sp>
+      <p:sp>
+        <p:nvSpPr>
+          <p:cNvPr id="4" name="Content Placeholder 3">
+            <a:extLst>
+              <a:ext uri="{FF2B5EF4-FFF2-40B4-BE49-F238E27FC236}">
+                <a16:creationId xmlns:a16="http://schemas.microsoft.com/office/drawing/2014/main" id="{46829F0D-5546-2AE7-E9FE-F17871C5AC2E}"/>
+              </a:ext>
+            </a:extLst>
+          </p:cNvPr>
+          <p:cNvSpPr txBox="1">
+            <a:spLocks noGrp="1"/>
+          </p:cNvSpPr>
+          <p:nvPr>
+            <p:ph idx="1"/>
+          </p:nvPr>
+        </p:nvSpPr>
+        <p:spPr>
+          <a:xfrm>
+            <a:off x="457200" y="1262743"/>
+            <a:ext cx="8229600" cy="2527615"/>
+          </a:xfrm>
+          <a:prstGeom prst="rect">
+            <a:avLst/>
+          </a:prstGeom>
+          <a:noFill/>
+        </p:spPr>
+        <p:txBody>
+          <a:bodyPr wrap="square">
+            <a:spAutoFit/>
+          </a:bodyPr>
+          <a:lstStyle/>
+          <a:p>
+            <a:pPr marL="285750" indent="-285750" algn="l">
+              <a:buFont typeface="Wingdings" panose="05000000000000000000" pitchFamily="2" charset="2"/>
+              <a:buChar char="q"/>
+            </a:pPr>
+            <a:r>
+              <a:rPr lang="en-US" b="1" i="0" dirty="0">
+                <a:solidFill>
+                  <a:srgbClr val="292929"/>
+                </a:solidFill>
+                <a:effectLst/>
+                <a:latin typeface="sohne"/>
+              </a:rPr>
+              <a:t>Oracle Mediator</a:t>
+            </a:r>
+          </a:p>
+          <a:p>
+            <a:pPr indent="342900" algn="l"/>
+            <a:r>
+              <a:rPr lang="en-US" sz="1500" b="1" dirty="0">
+                <a:solidFill>
+                  <a:srgbClr val="292929"/>
+                </a:solidFill>
+                <a:latin typeface="sohne"/>
+              </a:rPr>
+              <a:t> </a:t>
+            </a:r>
+            <a:r>
+              <a:rPr lang="en-US" sz="1500" dirty="0">
+                <a:solidFill>
+                  <a:srgbClr val="333333"/>
+                </a:solidFill>
+                <a:latin typeface="AmazonEmber"/>
+              </a:rPr>
+              <a:t>Analogous to a load balancer routing HTTP traffic, the Oracle Mediator routes data from service providers to external partners. In addition, it can subscribe to and publish business events.</a:t>
+            </a:r>
+          </a:p>
+          <a:p>
+            <a:pPr indent="342900" algn="l"/>
+            <a:endParaRPr lang="en-US" sz="1500" dirty="0">
+              <a:solidFill>
+                <a:srgbClr val="333333"/>
+              </a:solidFill>
+              <a:latin typeface="AmazonEmber"/>
+            </a:endParaRPr>
+          </a:p>
+          <a:p>
+            <a:pPr marL="285750" indent="-285750" algn="l">
+              <a:buFont typeface="Wingdings" panose="05000000000000000000" pitchFamily="2" charset="2"/>
+              <a:buChar char="q"/>
+            </a:pPr>
+            <a:r>
+              <a:rPr lang="en-US" b="1" i="0" dirty="0">
+                <a:solidFill>
+                  <a:srgbClr val="292929"/>
+                </a:solidFill>
+                <a:effectLst/>
+                <a:latin typeface="sohne"/>
+              </a:rPr>
+              <a:t>Oracle BPEL Process Manager</a:t>
+            </a:r>
+          </a:p>
+          <a:p>
+            <a:pPr lvl="1"/>
+            <a:r>
+              <a:rPr lang="en-US" sz="1500" dirty="0">
+                <a:solidFill>
+                  <a:srgbClr val="333333"/>
+                </a:solidFill>
+                <a:latin typeface="AmazonEmber"/>
+              </a:rPr>
+              <a:t>Oracle BPEL Process Manager provides the standard for assembling a set of discrete services into an end-to-end process flow, radically reducing the cost and complexity of process integration initiatives</a:t>
+            </a:r>
+            <a:r>
+              <a:rPr lang="en-US" b="0" i="0" dirty="0">
+                <a:solidFill>
+                  <a:srgbClr val="232323"/>
+                </a:solidFill>
+                <a:effectLst/>
+                <a:latin typeface="Verdana" panose="020B0604030504040204" pitchFamily="34" charset="0"/>
+              </a:rPr>
+              <a:t>.</a:t>
+            </a:r>
+            <a:endParaRPr lang="en-US" b="1" i="0" dirty="0">
+              <a:solidFill>
+                <a:srgbClr val="292929"/>
+              </a:solidFill>
+              <a:effectLst/>
+              <a:latin typeface="sohne"/>
+            </a:endParaRPr>
+          </a:p>
+          <a:p>
+            <a:pPr indent="342900" algn="l"/>
+            <a:endParaRPr lang="en-US" sz="1500" dirty="0">
+              <a:solidFill>
+                <a:srgbClr val="333333"/>
+              </a:solidFill>
+              <a:latin typeface="AmazonEmber"/>
+            </a:endParaRPr>
+          </a:p>
+        </p:txBody>
+      </p:sp>
+    </p:spTree>
+    <p:extLst>
+      <p:ext uri="{BB962C8B-B14F-4D97-AF65-F5344CB8AC3E}">
+        <p14:creationId xmlns:p14="http://schemas.microsoft.com/office/powerpoint/2010/main" val="2652110129"/>
+      </p:ext>
+    </p:extLst>
+  </p:cSld>
+  <p:clrMapOvr>
+    <a:masterClrMapping/>
+  </p:clrMapOvr>
+</p:sld>
+</file>
+
+<file path=ppt/slides/slide13.xml><?xml version="1.0" encoding="utf-8"?>
 <p:sld xmlns:a="http://schemas.openxmlformats.org/drawingml/2006/main" xmlns:r="http://schemas.openxmlformats.org/officeDocument/2006/relationships" xmlns:p="http://schemas.openxmlformats.org/presentationml/2006/main">
   <p:cSld>
     <p:spTree>
@@ -5347,7 +5673,7 @@
 </p:sld>
 </file>
 
-<file path=ppt/slides/slide13.xml><?xml version="1.0" encoding="utf-8"?>
+<file path=ppt/slides/slide14.xml><?xml version="1.0" encoding="utf-8"?>
 <p:sld xmlns:a="http://schemas.openxmlformats.org/drawingml/2006/main" xmlns:r="http://schemas.openxmlformats.org/officeDocument/2006/relationships" xmlns:p="http://schemas.openxmlformats.org/presentationml/2006/main">
   <p:cSld>
     <p:spTree>
@@ -6980,7 +7306,7 @@
 </p:sld>
 </file>
 
-<file path=ppt/slides/slide14.xml><?xml version="1.0" encoding="utf-8"?>
+<file path=ppt/slides/slide15.xml><?xml version="1.0" encoding="utf-8"?>
 <p:sld xmlns:a="http://schemas.openxmlformats.org/drawingml/2006/main" xmlns:r="http://schemas.openxmlformats.org/officeDocument/2006/relationships" xmlns:p="http://schemas.openxmlformats.org/presentationml/2006/main">
   <p:cSld>
     <p:spTree>
@@ -8107,7 +8433,7 @@
 </p:sld>
 </file>
 
-<file path=ppt/slides/slide15.xml><?xml version="1.0" encoding="utf-8"?>
+<file path=ppt/slides/slide16.xml><?xml version="1.0" encoding="utf-8"?>
 <p:sld xmlns:a="http://schemas.openxmlformats.org/drawingml/2006/main" xmlns:r="http://schemas.openxmlformats.org/officeDocument/2006/relationships" xmlns:p="http://schemas.openxmlformats.org/presentationml/2006/main">
   <p:cSld>
     <p:spTree>
@@ -8291,7 +8617,7 @@
 </p:sld>
 </file>
 
-<file path=ppt/slides/slide16.xml><?xml version="1.0" encoding="utf-8"?>
+<file path=ppt/slides/slide17.xml><?xml version="1.0" encoding="utf-8"?>
 <p:sld xmlns:a="http://schemas.openxmlformats.org/drawingml/2006/main" xmlns:r="http://schemas.openxmlformats.org/officeDocument/2006/relationships" xmlns:p="http://schemas.openxmlformats.org/presentationml/2006/main">
   <p:cSld>
     <p:spTree>
@@ -8396,7 +8722,7 @@
 </p:sld>
 </file>
 
-<file path=ppt/slides/slide17.xml><?xml version="1.0" encoding="utf-8"?>
+<file path=ppt/slides/slide18.xml><?xml version="1.0" encoding="utf-8"?>
 <p:sld xmlns:a="http://schemas.openxmlformats.org/drawingml/2006/main" xmlns:r="http://schemas.openxmlformats.org/officeDocument/2006/relationships" xmlns:p="http://schemas.openxmlformats.org/presentationml/2006/main">
   <p:cSld>
     <p:spTree>
@@ -10538,7 +10864,7 @@
           <p:cNvPr id="2" name="Content Placeholder 1">
             <a:extLst>
               <a:ext uri="{FF2B5EF4-FFF2-40B4-BE49-F238E27FC236}">
-                <a16:creationId xmlns:a16="http://schemas.microsoft.com/office/drawing/2014/main" id="{EBB35BBA-4A6A-DC4A-222E-5217FAF04C32}"/>
+                <a16:creationId xmlns:a16="http://schemas.microsoft.com/office/drawing/2014/main" id="{912418B3-0C5C-2AB6-0B26-75AE5D1C25F8}"/>
               </a:ext>
             </a:extLst>
           </p:cNvPr>
@@ -10551,18 +10877,183 @@
         </p:nvSpPr>
         <p:spPr>
           <a:xfrm>
-            <a:off x="304800" y="922178"/>
-            <a:ext cx="8229600" cy="4906963"/>
+            <a:off x="555223" y="1303025"/>
+            <a:ext cx="6065520" cy="2125975"/>
           </a:xfrm>
         </p:spPr>
         <p:txBody>
-          <a:bodyPr/>
+          <a:bodyPr>
+            <a:normAutofit fontScale="92500" lnSpcReduction="10000"/>
+          </a:bodyPr>
           <a:lstStyle/>
           <a:p>
-            <a:r>
-              <a:rPr lang="en-US" dirty="0"/>
-              <a:t>Some of Oracle SOA Components</a:t>
-            </a:r>
+            <a:pPr marL="231775" marR="0" lvl="1" indent="0" rtl="0">
+              <a:lnSpc>
+                <a:spcPct val="107000"/>
+              </a:lnSpc>
+              <a:spcBef>
+                <a:spcPts val="0"/>
+              </a:spcBef>
+              <a:spcAft>
+                <a:spcPts val="0"/>
+              </a:spcAft>
+              <a:buNone/>
+            </a:pPr>
+            <a:r>
+              <a:rPr lang="en-US" sz="1800" b="1" dirty="0">
+                <a:solidFill>
+                  <a:srgbClr val="292929"/>
+                </a:solidFill>
+                <a:latin typeface="sohne"/>
+              </a:rPr>
+              <a:t>Topics:	</a:t>
+            </a:r>
+          </a:p>
+          <a:p>
+            <a:pPr marL="231775" marR="0" lvl="1" indent="0" rtl="0">
+              <a:lnSpc>
+                <a:spcPct val="107000"/>
+              </a:lnSpc>
+              <a:spcBef>
+                <a:spcPts val="0"/>
+              </a:spcBef>
+              <a:spcAft>
+                <a:spcPts val="0"/>
+              </a:spcAft>
+              <a:buNone/>
+            </a:pPr>
+            <a:endParaRPr lang="en-US" sz="1800" b="1" dirty="0">
+              <a:solidFill>
+                <a:srgbClr val="292929"/>
+              </a:solidFill>
+              <a:latin typeface="sohne"/>
+            </a:endParaRPr>
+          </a:p>
+          <a:p>
+            <a:pPr marL="817554" lvl="2" indent="-285750">
+              <a:lnSpc>
+                <a:spcPct val="107000"/>
+              </a:lnSpc>
+              <a:spcBef>
+                <a:spcPts val="0"/>
+              </a:spcBef>
+              <a:buFont typeface="Courier New" panose="02070309020205020404" pitchFamily="49" charset="0"/>
+              <a:buChar char="o"/>
+            </a:pPr>
+            <a:r>
+              <a:rPr lang="en-US" sz="1800" b="1" dirty="0">
+                <a:solidFill>
+                  <a:srgbClr val="292929"/>
+                </a:solidFill>
+                <a:latin typeface="sohne"/>
+              </a:rPr>
+              <a:t>Overview of XML, XSD, Web-Services, SOAP, WSDL</a:t>
+            </a:r>
+          </a:p>
+          <a:p>
+            <a:pPr marL="817554" lvl="2" indent="-285750">
+              <a:lnSpc>
+                <a:spcPct val="107000"/>
+              </a:lnSpc>
+              <a:spcBef>
+                <a:spcPts val="0"/>
+              </a:spcBef>
+              <a:buFont typeface="Courier New" panose="02070309020205020404" pitchFamily="49" charset="0"/>
+              <a:buChar char="o"/>
+            </a:pPr>
+            <a:endParaRPr lang="en-US" sz="1800" b="1" dirty="0">
+              <a:solidFill>
+                <a:srgbClr val="292929"/>
+              </a:solidFill>
+              <a:latin typeface="sohne"/>
+            </a:endParaRPr>
+          </a:p>
+          <a:p>
+            <a:pPr marL="817554" lvl="2" indent="-288925">
+              <a:lnSpc>
+                <a:spcPct val="107000"/>
+              </a:lnSpc>
+              <a:spcBef>
+                <a:spcPts val="0"/>
+              </a:spcBef>
+              <a:buFont typeface="Courier New" panose="02070309020205020404" pitchFamily="49" charset="0"/>
+              <a:buChar char="o"/>
+            </a:pPr>
+            <a:r>
+              <a:rPr lang="en-US" sz="1800" b="1" dirty="0">
+                <a:solidFill>
+                  <a:srgbClr val="292929"/>
+                </a:solidFill>
+                <a:latin typeface="sohne"/>
+              </a:rPr>
+              <a:t>Web Services Sample Demonstration</a:t>
+            </a:r>
+          </a:p>
+          <a:p>
+            <a:pPr marL="817554" lvl="2" indent="-288925">
+              <a:lnSpc>
+                <a:spcPct val="107000"/>
+              </a:lnSpc>
+              <a:spcBef>
+                <a:spcPts val="0"/>
+              </a:spcBef>
+              <a:buFont typeface="Courier New" panose="02070309020205020404" pitchFamily="49" charset="0"/>
+              <a:buChar char="o"/>
+            </a:pPr>
+            <a:endParaRPr lang="en-US" sz="1800" b="1" dirty="0">
+              <a:solidFill>
+                <a:srgbClr val="292929"/>
+              </a:solidFill>
+              <a:latin typeface="sohne"/>
+            </a:endParaRPr>
+          </a:p>
+          <a:p>
+            <a:pPr marL="817554" lvl="2" indent="-288925">
+              <a:lnSpc>
+                <a:spcPct val="107000"/>
+              </a:lnSpc>
+              <a:spcBef>
+                <a:spcPts val="0"/>
+              </a:spcBef>
+              <a:spcAft>
+                <a:spcPts val="800"/>
+              </a:spcAft>
+              <a:buFont typeface="Courier New" panose="02070309020205020404" pitchFamily="49" charset="0"/>
+              <a:buChar char="o"/>
+            </a:pPr>
+            <a:r>
+              <a:rPr lang="en-US" sz="1800" b="1" dirty="0">
+                <a:solidFill>
+                  <a:srgbClr val="292929"/>
+                </a:solidFill>
+                <a:latin typeface="sohne"/>
+              </a:rPr>
+              <a:t>Understanding WSDL</a:t>
+            </a:r>
+          </a:p>
+          <a:p>
+            <a:pPr marL="817554" lvl="2" indent="-288925">
+              <a:lnSpc>
+                <a:spcPct val="107000"/>
+              </a:lnSpc>
+              <a:spcBef>
+                <a:spcPts val="0"/>
+              </a:spcBef>
+              <a:spcAft>
+                <a:spcPts val="800"/>
+              </a:spcAft>
+              <a:buFont typeface="Courier New" panose="02070309020205020404" pitchFamily="49" charset="0"/>
+              <a:buChar char="o"/>
+            </a:pPr>
+            <a:endParaRPr lang="en-US" sz="1800" b="1" dirty="0">
+              <a:solidFill>
+                <a:srgbClr val="292929"/>
+              </a:solidFill>
+              <a:latin typeface="sohne"/>
+            </a:endParaRPr>
+          </a:p>
+          <a:p>
+            <a:endParaRPr lang="en-US" dirty="0"/>
           </a:p>
         </p:txBody>
       </p:sp>
@@ -10571,7 +11062,7 @@
           <p:cNvPr id="3" name="Title 2">
             <a:extLst>
               <a:ext uri="{FF2B5EF4-FFF2-40B4-BE49-F238E27FC236}">
-                <a16:creationId xmlns:a16="http://schemas.microsoft.com/office/drawing/2014/main" id="{1EE94271-6AC1-62AE-3B8C-DBF5C6B5F87D}"/>
+                <a16:creationId xmlns:a16="http://schemas.microsoft.com/office/drawing/2014/main" id="{9A54B9A6-0CE3-DF04-CEBE-F39634C424D1}"/>
               </a:ext>
             </a:extLst>
           </p:cNvPr>
@@ -10588,318 +11079,44 @@
           <a:lstStyle/>
           <a:p>
             <a:r>
+              <a:rPr lang="en-US" b="1" dirty="0">
+                <a:solidFill>
+                  <a:schemeClr val="accent4">
+                    <a:lumMod val="75000"/>
+                  </a:schemeClr>
+                </a:solidFill>
+                <a:latin typeface="Segoe UI Semilight" panose="020B0402040204020203" pitchFamily="34" charset="0"/>
+                <a:cs typeface="Segoe UI Semilight" panose="020B0402040204020203" pitchFamily="34" charset="0"/>
+              </a:rPr>
+              <a:t>W</a:t>
+            </a:r>
+            <a:r>
               <a:rPr lang="en-US" dirty="0"/>
-              <a:t>SOA Introduction</a:t>
-            </a:r>
-          </a:p>
-        </p:txBody>
-      </p:sp>
-      <p:pic>
-        <p:nvPicPr>
-          <p:cNvPr id="2050" name="Picture 2" descr="Illustration showing the Service Infrastructure. It depicts the Service Infrastructure in a box, with the various components connecting to it. It shows it receiving messages from a SOAP binding component and the delivery API. It shows a composite application within the Service Infrastructure.">
-            <a:extLst>
-              <a:ext uri="{FF2B5EF4-FFF2-40B4-BE49-F238E27FC236}">
-                <a16:creationId xmlns:a16="http://schemas.microsoft.com/office/drawing/2014/main" id="{D05C213E-CD2D-D6E2-18DB-EF25C862BB8F}"/>
-              </a:ext>
-            </a:extLst>
-          </p:cNvPr>
-          <p:cNvPicPr>
-            <a:picLocks noChangeAspect="1" noChangeArrowheads="1"/>
-          </p:cNvPicPr>
-          <p:nvPr/>
-        </p:nvPicPr>
-        <p:blipFill>
-          <a:blip r:embed="rId2">
-            <a:alphaModFix amt="85000"/>
-            <a:extLst>
-              <a:ext uri="{28A0092B-C50C-407E-A947-70E740481C1C}">
-                <a14:useLocalDpi xmlns:a14="http://schemas.microsoft.com/office/drawing/2010/main" val="0"/>
-              </a:ext>
-            </a:extLst>
-          </a:blip>
-          <a:srcRect/>
-          <a:stretch>
-            <a:fillRect/>
-          </a:stretch>
-        </p:blipFill>
-        <p:spPr bwMode="auto">
-          <a:xfrm>
-            <a:off x="3902800" y="4010891"/>
-            <a:ext cx="5176259" cy="2425065"/>
-          </a:xfrm>
-          <a:prstGeom prst="rect">
-            <a:avLst/>
-          </a:prstGeom>
-          <a:noFill/>
-          <a:extLst>
-            <a:ext uri="{909E8E84-426E-40DD-AFC4-6F175D3DCCD1}">
-              <a14:hiddenFill xmlns:a14="http://schemas.microsoft.com/office/drawing/2010/main">
-                <a:solidFill>
-                  <a:srgbClr val="FFFFFF"/>
-                </a:solidFill>
-              </a14:hiddenFill>
-            </a:ext>
-          </a:extLst>
-        </p:spPr>
-      </p:pic>
-      <p:sp>
-        <p:nvSpPr>
-          <p:cNvPr id="6" name="TextBox 5">
-            <a:extLst>
-              <a:ext uri="{FF2B5EF4-FFF2-40B4-BE49-F238E27FC236}">
-                <a16:creationId xmlns:a16="http://schemas.microsoft.com/office/drawing/2014/main" id="{609DE738-DC89-84AB-9C81-3760EFCE5BBD}"/>
-              </a:ext>
-            </a:extLst>
-          </p:cNvPr>
-          <p:cNvSpPr txBox="1"/>
-          <p:nvPr/>
-        </p:nvSpPr>
-        <p:spPr>
-          <a:xfrm>
-            <a:off x="445251" y="1397680"/>
-            <a:ext cx="7383780" cy="830997"/>
-          </a:xfrm>
-          <a:prstGeom prst="rect">
-            <a:avLst/>
-          </a:prstGeom>
-          <a:noFill/>
-        </p:spPr>
-        <p:txBody>
-          <a:bodyPr wrap="square">
-            <a:spAutoFit/>
-          </a:bodyPr>
-          <a:lstStyle/>
-          <a:p>
-            <a:pPr marL="285750" indent="-285750" algn="l">
-              <a:buFont typeface="Wingdings" panose="05000000000000000000" pitchFamily="2" charset="2"/>
-              <a:buChar char="q"/>
-            </a:pPr>
-            <a:r>
-              <a:rPr lang="en-US" b="1" i="0" dirty="0">
-                <a:solidFill>
-                  <a:srgbClr val="292929"/>
-                </a:solidFill>
-                <a:effectLst/>
-                <a:latin typeface="sohne"/>
-              </a:rPr>
-              <a:t>Service Infrastructure</a:t>
-            </a:r>
-          </a:p>
-          <a:p>
-            <a:pPr lvl="1"/>
-            <a:r>
-              <a:rPr lang="en-US" sz="1500" dirty="0">
-                <a:solidFill>
-                  <a:srgbClr val="333333"/>
-                </a:solidFill>
-                <a:latin typeface="AmazonEmber"/>
-              </a:rPr>
-              <a:t>Service Infra allows the linking of components via the internal message routing structure. Along with this, it allows the data flow.</a:t>
-            </a:r>
-          </a:p>
-        </p:txBody>
-      </p:sp>
-      <p:sp>
-        <p:nvSpPr>
-          <p:cNvPr id="10" name="TextBox 9">
-            <a:extLst>
-              <a:ext uri="{FF2B5EF4-FFF2-40B4-BE49-F238E27FC236}">
-                <a16:creationId xmlns:a16="http://schemas.microsoft.com/office/drawing/2014/main" id="{0D76DD70-7C17-8608-45E4-E528835BA7A5}"/>
-              </a:ext>
-            </a:extLst>
-          </p:cNvPr>
-          <p:cNvSpPr txBox="1"/>
-          <p:nvPr/>
-        </p:nvSpPr>
-        <p:spPr>
-          <a:xfrm>
-            <a:off x="445251" y="2339743"/>
-            <a:ext cx="6996197" cy="830997"/>
-          </a:xfrm>
-          <a:prstGeom prst="rect">
-            <a:avLst/>
-          </a:prstGeom>
-          <a:noFill/>
-        </p:spPr>
-        <p:txBody>
-          <a:bodyPr wrap="square">
-            <a:spAutoFit/>
-          </a:bodyPr>
-          <a:lstStyle/>
-          <a:p>
-            <a:pPr marL="285750" indent="-285750" algn="l">
-              <a:buFont typeface="Wingdings" panose="05000000000000000000" pitchFamily="2" charset="2"/>
-              <a:buChar char="q"/>
-            </a:pPr>
-            <a:r>
-              <a:rPr lang="en-US" b="1" i="0" dirty="0">
-                <a:solidFill>
-                  <a:srgbClr val="292929"/>
-                </a:solidFill>
-                <a:effectLst/>
-                <a:latin typeface="sohne"/>
-              </a:rPr>
-              <a:t>Oracle Adapters:</a:t>
-            </a:r>
-          </a:p>
-          <a:p>
-            <a:pPr lvl="1"/>
-            <a:r>
-              <a:rPr lang="en-US" sz="1500" dirty="0">
-                <a:solidFill>
-                  <a:srgbClr val="333333"/>
-                </a:solidFill>
-                <a:latin typeface="AmazonEmber"/>
-              </a:rPr>
-              <a:t>The Oracle Adapters uses the JCA technology to establish a link between the Oracle SOA Suite and the external systems.</a:t>
-            </a:r>
-          </a:p>
-        </p:txBody>
-      </p:sp>
-      <p:sp>
-        <p:nvSpPr>
-          <p:cNvPr id="12" name="TextBox 11">
-            <a:extLst>
-              <a:ext uri="{FF2B5EF4-FFF2-40B4-BE49-F238E27FC236}">
-                <a16:creationId xmlns:a16="http://schemas.microsoft.com/office/drawing/2014/main" id="{5AD92F29-6B79-DEA3-792E-048B84EE9034}"/>
-              </a:ext>
-            </a:extLst>
-          </p:cNvPr>
-          <p:cNvSpPr txBox="1"/>
-          <p:nvPr/>
-        </p:nvSpPr>
-        <p:spPr>
-          <a:xfrm>
-            <a:off x="445251" y="3301624"/>
-            <a:ext cx="6165617" cy="1061829"/>
-          </a:xfrm>
-          <a:prstGeom prst="rect">
-            <a:avLst/>
-          </a:prstGeom>
-          <a:noFill/>
-        </p:spPr>
-        <p:txBody>
-          <a:bodyPr wrap="square">
-            <a:spAutoFit/>
-          </a:bodyPr>
-          <a:lstStyle/>
-          <a:p>
-            <a:pPr marL="285750" indent="-285750" algn="l">
-              <a:buFont typeface="Wingdings" panose="05000000000000000000" pitchFamily="2" charset="2"/>
-              <a:buChar char="q"/>
-            </a:pPr>
-            <a:r>
-              <a:rPr lang="en-US" b="1" i="0" dirty="0">
-                <a:solidFill>
-                  <a:srgbClr val="292929"/>
-                </a:solidFill>
-                <a:effectLst/>
-                <a:latin typeface="sohne"/>
-              </a:rPr>
-              <a:t>Oracle Mediator</a:t>
-            </a:r>
-          </a:p>
-          <a:p>
-            <a:pPr indent="342900" algn="l"/>
-            <a:r>
-              <a:rPr lang="en-US" sz="1500" b="1" dirty="0">
-                <a:solidFill>
-                  <a:srgbClr val="292929"/>
-                </a:solidFill>
-                <a:latin typeface="sohne"/>
+              <a:t>eb</a:t>
+            </a:r>
+            <a:r>
+              <a:rPr lang="en-US" b="1" dirty="0">
+                <a:solidFill>
+                  <a:schemeClr val="tx2">
+                    <a:lumMod val="50000"/>
+                  </a:schemeClr>
+                </a:solidFill>
+                <a:latin typeface="Segoe UI Semilight" panose="020B0402040204020203" pitchFamily="34" charset="0"/>
+                <a:cs typeface="Segoe UI Semilight" panose="020B0402040204020203" pitchFamily="34" charset="0"/>
               </a:rPr>
               <a:t> </a:t>
             </a:r>
             <a:r>
-              <a:rPr lang="en-US" sz="1500" dirty="0">
-                <a:solidFill>
-                  <a:srgbClr val="333333"/>
-                </a:solidFill>
-                <a:latin typeface="AmazonEmber"/>
-              </a:rPr>
-              <a:t>Analogous to a load balancer routing HTTP traffic, the Oracle Mediator routes data from service providers to external partners. In addition, it can subscribe to and publish business events.</a:t>
-            </a:r>
-          </a:p>
-        </p:txBody>
-      </p:sp>
-      <p:sp>
-        <p:nvSpPr>
-          <p:cNvPr id="14" name="TextBox 13">
-            <a:extLst>
-              <a:ext uri="{FF2B5EF4-FFF2-40B4-BE49-F238E27FC236}">
-                <a16:creationId xmlns:a16="http://schemas.microsoft.com/office/drawing/2014/main" id="{6EE3C4AF-7DB6-54B8-474D-8258066E702F}"/>
-              </a:ext>
-            </a:extLst>
-          </p:cNvPr>
-          <p:cNvSpPr txBox="1"/>
-          <p:nvPr/>
-        </p:nvSpPr>
-        <p:spPr>
-          <a:xfrm>
-            <a:off x="445251" y="4494338"/>
-            <a:ext cx="4572000" cy="1569660"/>
-          </a:xfrm>
-          <a:prstGeom prst="rect">
-            <a:avLst/>
-          </a:prstGeom>
-          <a:noFill/>
-        </p:spPr>
-        <p:txBody>
-          <a:bodyPr wrap="square">
-            <a:spAutoFit/>
-          </a:bodyPr>
-          <a:lstStyle/>
-          <a:p>
-            <a:pPr marL="285750" indent="-285750" algn="l">
-              <a:buFont typeface="Wingdings" panose="05000000000000000000" pitchFamily="2" charset="2"/>
-              <a:buChar char="q"/>
-            </a:pPr>
-            <a:r>
-              <a:rPr lang="en-US" b="1" i="0" dirty="0">
-                <a:solidFill>
-                  <a:srgbClr val="292929"/>
-                </a:solidFill>
-                <a:effectLst/>
-                <a:latin typeface="sohne"/>
-              </a:rPr>
-              <a:t>Oracle BPEL Process Manager</a:t>
-            </a:r>
-          </a:p>
-          <a:p>
-            <a:pPr lvl="1"/>
-            <a:r>
-              <a:rPr lang="en-US" sz="1500" dirty="0">
-                <a:solidFill>
-                  <a:srgbClr val="333333"/>
-                </a:solidFill>
-                <a:latin typeface="AmazonEmber"/>
-              </a:rPr>
-              <a:t>Oracle BPEL Process Manager provides the standard for assembling a set of discrete services into an end-to-end process flow, radically reducing the cost and complexity of process integration initiatives</a:t>
-            </a:r>
-            <a:r>
-              <a:rPr lang="en-US" b="0" i="0" dirty="0">
-                <a:solidFill>
-                  <a:srgbClr val="232323"/>
-                </a:solidFill>
-                <a:effectLst/>
-                <a:latin typeface="Verdana" panose="020B0604030504040204" pitchFamily="34" charset="0"/>
-              </a:rPr>
-              <a:t>.</a:t>
-            </a:r>
-            <a:endParaRPr lang="en-US" b="1" i="0" dirty="0">
-              <a:solidFill>
-                <a:srgbClr val="292929"/>
-              </a:solidFill>
-              <a:effectLst/>
-              <a:latin typeface="sohne"/>
-            </a:endParaRPr>
+              <a:rPr lang="en-US" dirty="0"/>
+              <a:t>Services Introduction </a:t>
+            </a:r>
           </a:p>
         </p:txBody>
       </p:sp>
     </p:spTree>
     <p:extLst>
       <p:ext uri="{BB962C8B-B14F-4D97-AF65-F5344CB8AC3E}">
-        <p14:creationId xmlns:p14="http://schemas.microsoft.com/office/powerpoint/2010/main" val="171805125"/>
+        <p14:creationId xmlns:p14="http://schemas.microsoft.com/office/powerpoint/2010/main" val="3838409942"/>
       </p:ext>
     </p:extLst>
   </p:cSld>
@@ -10931,7 +11148,7 @@
           <p:cNvPr id="2" name="Content Placeholder 1">
             <a:extLst>
               <a:ext uri="{FF2B5EF4-FFF2-40B4-BE49-F238E27FC236}">
-                <a16:creationId xmlns:a16="http://schemas.microsoft.com/office/drawing/2014/main" id="{912418B3-0C5C-2AB6-0B26-75AE5D1C25F8}"/>
+                <a16:creationId xmlns:a16="http://schemas.microsoft.com/office/drawing/2014/main" id="{B8601D58-6113-2824-61B1-928A5F206AFE}"/>
               </a:ext>
             </a:extLst>
           </p:cNvPr>
@@ -10944,182 +11161,203 @@
         </p:nvSpPr>
         <p:spPr>
           <a:xfrm>
-            <a:off x="555223" y="1303025"/>
-            <a:ext cx="6065520" cy="2125975"/>
+            <a:off x="365760" y="975518"/>
+            <a:ext cx="8229600" cy="4906963"/>
           </a:xfrm>
         </p:spPr>
         <p:txBody>
           <a:bodyPr>
-            <a:normAutofit fontScale="92500" lnSpcReduction="10000"/>
+            <a:normAutofit lnSpcReduction="10000"/>
           </a:bodyPr>
           <a:lstStyle/>
           <a:p>
-            <a:pPr marL="231775" marR="0" lvl="1" indent="0" rtl="0">
-              <a:lnSpc>
-                <a:spcPct val="107000"/>
-              </a:lnSpc>
-              <a:spcBef>
-                <a:spcPts val="0"/>
-              </a:spcBef>
-              <a:spcAft>
-                <a:spcPts val="0"/>
-              </a:spcAft>
-              <a:buNone/>
+            <a:r>
+              <a:rPr lang="en-US" sz="2000" b="1" dirty="0">
+                <a:solidFill>
+                  <a:srgbClr val="292929"/>
+                </a:solidFill>
+                <a:latin typeface="sohne"/>
+              </a:rPr>
+              <a:t>Overview of XML, XSD, Web-Services, WSDL , SOAP</a:t>
+            </a:r>
+          </a:p>
+          <a:p>
+            <a:endParaRPr lang="en-US" dirty="0"/>
+          </a:p>
+          <a:p>
+            <a:pPr lvl="1">
+              <a:buFont typeface="Wingdings" panose="05000000000000000000" pitchFamily="2" charset="2"/>
+              <a:buChar char="q"/>
             </a:pPr>
             <a:r>
-              <a:rPr lang="en-US" sz="1800" b="1" dirty="0">
-                <a:solidFill>
-                  <a:srgbClr val="292929"/>
-                </a:solidFill>
-                <a:latin typeface="sohne"/>
-              </a:rPr>
-              <a:t>Topics:	</a:t>
-            </a:r>
-          </a:p>
-          <a:p>
-            <a:pPr marL="231775" marR="0" lvl="1" indent="0" rtl="0">
-              <a:lnSpc>
-                <a:spcPct val="107000"/>
-              </a:lnSpc>
-              <a:spcBef>
-                <a:spcPts val="0"/>
-              </a:spcBef>
-              <a:spcAft>
-                <a:spcPts val="0"/>
-              </a:spcAft>
-              <a:buNone/>
+              <a:rPr lang="en-US" dirty="0"/>
+              <a:t>XML: </a:t>
+            </a:r>
+            <a:r>
+              <a:rPr lang="en-US" dirty="0" err="1"/>
+              <a:t>eXtensible</a:t>
+            </a:r>
+            <a:r>
+              <a:rPr lang="en-US" dirty="0"/>
+              <a:t> Markup Language</a:t>
+            </a:r>
+          </a:p>
+          <a:p>
+            <a:pPr lvl="2"/>
+            <a:r>
+              <a:rPr lang="en-US" dirty="0">
+                <a:solidFill>
+                  <a:schemeClr val="bg2">
+                    <a:lumMod val="50000"/>
+                  </a:schemeClr>
+                </a:solidFill>
+              </a:rPr>
+              <a:t>Use Tags to elements within a document</a:t>
+            </a:r>
+          </a:p>
+          <a:p>
+            <a:pPr lvl="2"/>
+            <a:r>
+              <a:rPr lang="en-US" sz="1800" dirty="0">
+                <a:solidFill>
+                  <a:schemeClr val="bg2">
+                    <a:lumMod val="50000"/>
+                  </a:schemeClr>
+                </a:solidFill>
+                <a:effectLst/>
+                <a:latin typeface="Calibri" panose="020F0502020204030204" pitchFamily="34" charset="0"/>
+              </a:rPr>
+              <a:t>Designed to store and transport data</a:t>
+            </a:r>
+            <a:endParaRPr lang="en-US" dirty="0">
+              <a:solidFill>
+                <a:schemeClr val="bg2">
+                  <a:lumMod val="50000"/>
+                </a:schemeClr>
+              </a:solidFill>
+            </a:endParaRPr>
+          </a:p>
+          <a:p>
+            <a:pPr lvl="1">
+              <a:buFont typeface="Wingdings" panose="05000000000000000000" pitchFamily="2" charset="2"/>
+              <a:buChar char="q"/>
             </a:pPr>
-            <a:endParaRPr lang="en-US" sz="1800" b="1" dirty="0">
-              <a:solidFill>
-                <a:srgbClr val="292929"/>
-              </a:solidFill>
-              <a:latin typeface="sohne"/>
-            </a:endParaRPr>
-          </a:p>
-          <a:p>
-            <a:pPr marL="817554" lvl="2" indent="-285750">
-              <a:lnSpc>
-                <a:spcPct val="107000"/>
-              </a:lnSpc>
-              <a:spcBef>
-                <a:spcPts val="0"/>
-              </a:spcBef>
-              <a:buFont typeface="Courier New" panose="02070309020205020404" pitchFamily="49" charset="0"/>
-              <a:buChar char="o"/>
+            <a:endParaRPr lang="en-US" dirty="0"/>
+          </a:p>
+          <a:p>
+            <a:pPr lvl="1">
+              <a:buFont typeface="Wingdings" panose="05000000000000000000" pitchFamily="2" charset="2"/>
+              <a:buChar char="q"/>
             </a:pPr>
             <a:r>
-              <a:rPr lang="en-US" sz="1800" b="1" dirty="0">
-                <a:solidFill>
-                  <a:srgbClr val="292929"/>
-                </a:solidFill>
-                <a:latin typeface="sohne"/>
-              </a:rPr>
-              <a:t>Overview of XML, XSD, Web-Services, SOAP, WSDL</a:t>
-            </a:r>
-          </a:p>
-          <a:p>
-            <a:pPr marL="817554" lvl="2" indent="-285750">
-              <a:lnSpc>
-                <a:spcPct val="107000"/>
-              </a:lnSpc>
-              <a:spcBef>
-                <a:spcPts val="0"/>
-              </a:spcBef>
-              <a:buFont typeface="Courier New" panose="02070309020205020404" pitchFamily="49" charset="0"/>
-              <a:buChar char="o"/>
+              <a:rPr lang="en-US" dirty="0"/>
+              <a:t>XSD: XML Schema Definition </a:t>
+            </a:r>
+          </a:p>
+          <a:p>
+            <a:pPr lvl="2"/>
+            <a:r>
+              <a:rPr lang="en-US" dirty="0">
+                <a:solidFill>
+                  <a:schemeClr val="bg2">
+                    <a:lumMod val="50000"/>
+                  </a:schemeClr>
+                </a:solidFill>
+              </a:rPr>
+              <a:t>Several Standard to form XML file and validate:</a:t>
+            </a:r>
+          </a:p>
+          <a:p>
+            <a:pPr lvl="3"/>
+            <a:r>
+              <a:rPr lang="en-US" dirty="0">
+                <a:solidFill>
+                  <a:schemeClr val="bg2">
+                    <a:lumMod val="50000"/>
+                  </a:schemeClr>
+                </a:solidFill>
+              </a:rPr>
+              <a:t>XSD </a:t>
+            </a:r>
+          </a:p>
+          <a:p>
+            <a:pPr lvl="3"/>
+            <a:r>
+              <a:rPr lang="en-US" dirty="0">
+                <a:solidFill>
+                  <a:schemeClr val="bg2">
+                    <a:lumMod val="50000"/>
+                  </a:schemeClr>
+                </a:solidFill>
+              </a:rPr>
+              <a:t>DTD</a:t>
+            </a:r>
+          </a:p>
+          <a:p>
+            <a:pPr lvl="3"/>
+            <a:r>
+              <a:rPr lang="en-US" dirty="0">
+                <a:solidFill>
+                  <a:schemeClr val="bg2">
+                    <a:lumMod val="50000"/>
+                  </a:schemeClr>
+                </a:solidFill>
+              </a:rPr>
+              <a:t>…</a:t>
+            </a:r>
+            <a:endParaRPr lang="en-US" dirty="0"/>
+          </a:p>
+          <a:p>
+            <a:pPr algn="l"/>
+            <a:r>
+              <a:rPr lang="en-US" b="0" i="0" dirty="0">
+                <a:solidFill>
+                  <a:srgbClr val="FFFFFF"/>
+                </a:solidFill>
+                <a:effectLst/>
+                <a:latin typeface="walsheim"/>
+              </a:rPr>
+              <a:t>Web Services</a:t>
+            </a:r>
+          </a:p>
+          <a:p>
+            <a:pPr marL="574675" indent="-234950" algn="l">
+              <a:buFont typeface="Wingdings" panose="05000000000000000000" pitchFamily="2" charset="2"/>
+              <a:buChar char="q"/>
             </a:pPr>
-            <a:endParaRPr lang="en-US" sz="1800" b="1" dirty="0">
-              <a:solidFill>
-                <a:srgbClr val="292929"/>
-              </a:solidFill>
-              <a:latin typeface="sohne"/>
-            </a:endParaRPr>
-          </a:p>
-          <a:p>
-            <a:pPr marL="817554" lvl="2" indent="-288925">
-              <a:lnSpc>
-                <a:spcPct val="107000"/>
-              </a:lnSpc>
-              <a:spcBef>
-                <a:spcPts val="0"/>
-              </a:spcBef>
-              <a:buFont typeface="Courier New" panose="02070309020205020404" pitchFamily="49" charset="0"/>
-              <a:buChar char="o"/>
+            <a:r>
+              <a:rPr lang="en-US" sz="1500" dirty="0"/>
+              <a:t>Web Services </a:t>
+            </a:r>
+          </a:p>
+          <a:p>
+            <a:pPr marL="925506" lvl="1" indent="-285750">
+              <a:buFont typeface="Arial" panose="020B0604020202020204" pitchFamily="34" charset="0"/>
+              <a:buChar char="•"/>
             </a:pPr>
             <a:r>
-              <a:rPr lang="en-US" sz="1800" b="1" dirty="0">
-                <a:solidFill>
-                  <a:srgbClr val="292929"/>
-                </a:solidFill>
-                <a:latin typeface="sohne"/>
-              </a:rPr>
-              <a:t>Web Services Sample Demonstration</a:t>
-            </a:r>
-          </a:p>
-          <a:p>
-            <a:pPr marL="817554" lvl="2" indent="-288925">
-              <a:lnSpc>
-                <a:spcPct val="107000"/>
-              </a:lnSpc>
-              <a:spcBef>
-                <a:spcPts val="0"/>
-              </a:spcBef>
-              <a:buFont typeface="Courier New" panose="02070309020205020404" pitchFamily="49" charset="0"/>
-              <a:buChar char="o"/>
+              <a:rPr lang="en-US" dirty="0">
+                <a:solidFill>
+                  <a:schemeClr val="bg2">
+                    <a:lumMod val="50000"/>
+                  </a:schemeClr>
+                </a:solidFill>
+              </a:rPr>
+              <a:t>The latest distributed technology and, as we will see, the most suitable technology for the realization of SOA. They have become the commonly used technology for interoperability and the integration of applications and information systems. Web Services provide the technological foundation for achieving interoperability between applications using different software platforms, operating systems, and programming.</a:t>
+            </a:r>
+          </a:p>
+          <a:p>
+            <a:pPr lvl="1">
+              <a:buFont typeface="Wingdings" panose="05000000000000000000" pitchFamily="2" charset="2"/>
+              <a:buChar char="q"/>
             </a:pPr>
-            <a:endParaRPr lang="en-US" sz="1800" b="1" dirty="0">
-              <a:solidFill>
-                <a:srgbClr val="292929"/>
-              </a:solidFill>
-              <a:latin typeface="sohne"/>
-            </a:endParaRPr>
-          </a:p>
-          <a:p>
-            <a:pPr marL="817554" lvl="2" indent="-288925">
-              <a:lnSpc>
-                <a:spcPct val="107000"/>
-              </a:lnSpc>
-              <a:spcBef>
-                <a:spcPts val="0"/>
-              </a:spcBef>
-              <a:spcAft>
-                <a:spcPts val="800"/>
-              </a:spcAft>
-              <a:buFont typeface="Courier New" panose="02070309020205020404" pitchFamily="49" charset="0"/>
-              <a:buChar char="o"/>
+            <a:endParaRPr lang="en-US" dirty="0"/>
+          </a:p>
+          <a:p>
+            <a:pPr lvl="1">
+              <a:buFont typeface="Wingdings" panose="05000000000000000000" pitchFamily="2" charset="2"/>
+              <a:buChar char="q"/>
             </a:pPr>
-            <a:r>
-              <a:rPr lang="en-US" sz="1800" b="1" dirty="0">
-                <a:solidFill>
-                  <a:srgbClr val="292929"/>
-                </a:solidFill>
-                <a:latin typeface="sohne"/>
-              </a:rPr>
-              <a:t>Understanding WSDL</a:t>
-            </a:r>
-          </a:p>
-          <a:p>
-            <a:pPr marL="817554" lvl="2" indent="-288925">
-              <a:lnSpc>
-                <a:spcPct val="107000"/>
-              </a:lnSpc>
-              <a:spcBef>
-                <a:spcPts val="0"/>
-              </a:spcBef>
-              <a:spcAft>
-                <a:spcPts val="800"/>
-              </a:spcAft>
-              <a:buFont typeface="Courier New" panose="02070309020205020404" pitchFamily="49" charset="0"/>
-              <a:buChar char="o"/>
-            </a:pPr>
-            <a:endParaRPr lang="en-US" sz="1800" b="1" dirty="0">
-              <a:solidFill>
-                <a:srgbClr val="292929"/>
-              </a:solidFill>
-              <a:latin typeface="sohne"/>
-            </a:endParaRPr>
-          </a:p>
-          <a:p>
             <a:endParaRPr lang="en-US" dirty="0"/>
           </a:p>
         </p:txBody>
@@ -11129,7 +11367,7 @@
           <p:cNvPr id="3" name="Title 2">
             <a:extLst>
               <a:ext uri="{FF2B5EF4-FFF2-40B4-BE49-F238E27FC236}">
-                <a16:creationId xmlns:a16="http://schemas.microsoft.com/office/drawing/2014/main" id="{9A54B9A6-0CE3-DF04-CEBE-F39634C424D1}"/>
+                <a16:creationId xmlns:a16="http://schemas.microsoft.com/office/drawing/2014/main" id="{265C0078-30AC-AD5E-A251-94230D599BE2}"/>
               </a:ext>
             </a:extLst>
           </p:cNvPr>
@@ -11183,7 +11421,7 @@
     </p:spTree>
     <p:extLst>
       <p:ext uri="{BB962C8B-B14F-4D97-AF65-F5344CB8AC3E}">
-        <p14:creationId xmlns:p14="http://schemas.microsoft.com/office/powerpoint/2010/main" val="3838409942"/>
+        <p14:creationId xmlns:p14="http://schemas.microsoft.com/office/powerpoint/2010/main" val="2253637421"/>
       </p:ext>
     </p:extLst>
   </p:cSld>
@@ -11215,296 +11453,6 @@
           <p:cNvPr id="2" name="Content Placeholder 1">
             <a:extLst>
               <a:ext uri="{FF2B5EF4-FFF2-40B4-BE49-F238E27FC236}">
-                <a16:creationId xmlns:a16="http://schemas.microsoft.com/office/drawing/2014/main" id="{B8601D58-6113-2824-61B1-928A5F206AFE}"/>
-              </a:ext>
-            </a:extLst>
-          </p:cNvPr>
-          <p:cNvSpPr>
-            <a:spLocks noGrp="1"/>
-          </p:cNvSpPr>
-          <p:nvPr>
-            <p:ph idx="1"/>
-          </p:nvPr>
-        </p:nvSpPr>
-        <p:spPr>
-          <a:xfrm>
-            <a:off x="365760" y="975518"/>
-            <a:ext cx="8229600" cy="4906963"/>
-          </a:xfrm>
-        </p:spPr>
-        <p:txBody>
-          <a:bodyPr/>
-          <a:lstStyle/>
-          <a:p>
-            <a:r>
-              <a:rPr lang="en-US" sz="2000" b="1" dirty="0">
-                <a:solidFill>
-                  <a:srgbClr val="292929"/>
-                </a:solidFill>
-                <a:latin typeface="sohne"/>
-              </a:rPr>
-              <a:t>Overview of XML, XSD, Web-Services, WSDL , SOAP</a:t>
-            </a:r>
-          </a:p>
-          <a:p>
-            <a:endParaRPr lang="en-US" dirty="0"/>
-          </a:p>
-          <a:p>
-            <a:pPr lvl="1">
-              <a:buFont typeface="Wingdings" panose="05000000000000000000" pitchFamily="2" charset="2"/>
-              <a:buChar char="q"/>
-            </a:pPr>
-            <a:r>
-              <a:rPr lang="en-US" dirty="0"/>
-              <a:t>XML: </a:t>
-            </a:r>
-            <a:r>
-              <a:rPr lang="en-US" dirty="0" err="1"/>
-              <a:t>eXtensible</a:t>
-            </a:r>
-            <a:r>
-              <a:rPr lang="en-US" dirty="0"/>
-              <a:t> Markup Language</a:t>
-            </a:r>
-          </a:p>
-          <a:p>
-            <a:pPr lvl="2"/>
-            <a:r>
-              <a:rPr lang="en-US" dirty="0">
-                <a:solidFill>
-                  <a:schemeClr val="bg2">
-                    <a:lumMod val="50000"/>
-                  </a:schemeClr>
-                </a:solidFill>
-              </a:rPr>
-              <a:t>Use Tags to elements within a document</a:t>
-            </a:r>
-          </a:p>
-          <a:p>
-            <a:pPr lvl="2"/>
-            <a:r>
-              <a:rPr lang="en-US" sz="1800" dirty="0">
-                <a:solidFill>
-                  <a:schemeClr val="bg2">
-                    <a:lumMod val="50000"/>
-                  </a:schemeClr>
-                </a:solidFill>
-                <a:effectLst/>
-                <a:latin typeface="Calibri" panose="020F0502020204030204" pitchFamily="34" charset="0"/>
-              </a:rPr>
-              <a:t>Designed to store and transport data</a:t>
-            </a:r>
-            <a:endParaRPr lang="en-US" dirty="0">
-              <a:solidFill>
-                <a:schemeClr val="bg2">
-                  <a:lumMod val="50000"/>
-                </a:schemeClr>
-              </a:solidFill>
-            </a:endParaRPr>
-          </a:p>
-          <a:p>
-            <a:pPr lvl="1">
-              <a:buFont typeface="Wingdings" panose="05000000000000000000" pitchFamily="2" charset="2"/>
-              <a:buChar char="q"/>
-            </a:pPr>
-            <a:endParaRPr lang="en-US" dirty="0"/>
-          </a:p>
-          <a:p>
-            <a:pPr lvl="1">
-              <a:buFont typeface="Wingdings" panose="05000000000000000000" pitchFamily="2" charset="2"/>
-              <a:buChar char="q"/>
-            </a:pPr>
-            <a:r>
-              <a:rPr lang="en-US" dirty="0"/>
-              <a:t>XSD: XML Schema Definition </a:t>
-            </a:r>
-          </a:p>
-          <a:p>
-            <a:pPr lvl="2"/>
-            <a:r>
-              <a:rPr lang="en-US" dirty="0">
-                <a:solidFill>
-                  <a:schemeClr val="bg2">
-                    <a:lumMod val="50000"/>
-                  </a:schemeClr>
-                </a:solidFill>
-              </a:rPr>
-              <a:t>Several Standard to form XML file and validate:</a:t>
-            </a:r>
-          </a:p>
-          <a:p>
-            <a:pPr lvl="3"/>
-            <a:r>
-              <a:rPr lang="en-US" dirty="0">
-                <a:solidFill>
-                  <a:schemeClr val="bg2">
-                    <a:lumMod val="50000"/>
-                  </a:schemeClr>
-                </a:solidFill>
-              </a:rPr>
-              <a:t>XSD </a:t>
-            </a:r>
-          </a:p>
-          <a:p>
-            <a:pPr lvl="3"/>
-            <a:r>
-              <a:rPr lang="en-US" dirty="0">
-                <a:solidFill>
-                  <a:schemeClr val="bg2">
-                    <a:lumMod val="50000"/>
-                  </a:schemeClr>
-                </a:solidFill>
-              </a:rPr>
-              <a:t>DTD</a:t>
-            </a:r>
-          </a:p>
-          <a:p>
-            <a:pPr lvl="3"/>
-            <a:r>
-              <a:rPr lang="en-US" dirty="0">
-                <a:solidFill>
-                  <a:schemeClr val="bg2">
-                    <a:lumMod val="50000"/>
-                  </a:schemeClr>
-                </a:solidFill>
-              </a:rPr>
-              <a:t>…</a:t>
-            </a:r>
-          </a:p>
-          <a:p>
-            <a:pPr lvl="3"/>
-            <a:endParaRPr lang="en-US" dirty="0">
-              <a:solidFill>
-                <a:schemeClr val="bg2">
-                  <a:lumMod val="50000"/>
-                </a:schemeClr>
-              </a:solidFill>
-            </a:endParaRPr>
-          </a:p>
-          <a:p>
-            <a:pPr lvl="3"/>
-            <a:endParaRPr lang="en-US" dirty="0">
-              <a:solidFill>
-                <a:schemeClr val="bg2">
-                  <a:lumMod val="50000"/>
-                </a:schemeClr>
-              </a:solidFill>
-            </a:endParaRPr>
-          </a:p>
-          <a:p>
-            <a:pPr lvl="1">
-              <a:buFont typeface="Wingdings" panose="05000000000000000000" pitchFamily="2" charset="2"/>
-              <a:buChar char="q"/>
-            </a:pPr>
-            <a:endParaRPr lang="en-US" dirty="0"/>
-          </a:p>
-          <a:p>
-            <a:pPr lvl="1">
-              <a:buFont typeface="Wingdings" panose="05000000000000000000" pitchFamily="2" charset="2"/>
-              <a:buChar char="q"/>
-            </a:pPr>
-            <a:endParaRPr lang="en-US" dirty="0"/>
-          </a:p>
-          <a:p>
-            <a:pPr lvl="1">
-              <a:buFont typeface="Wingdings" panose="05000000000000000000" pitchFamily="2" charset="2"/>
-              <a:buChar char="q"/>
-            </a:pPr>
-            <a:endParaRPr lang="en-US" dirty="0"/>
-          </a:p>
-        </p:txBody>
-      </p:sp>
-      <p:sp>
-        <p:nvSpPr>
-          <p:cNvPr id="3" name="Title 2">
-            <a:extLst>
-              <a:ext uri="{FF2B5EF4-FFF2-40B4-BE49-F238E27FC236}">
-                <a16:creationId xmlns:a16="http://schemas.microsoft.com/office/drawing/2014/main" id="{265C0078-30AC-AD5E-A251-94230D599BE2}"/>
-              </a:ext>
-            </a:extLst>
-          </p:cNvPr>
-          <p:cNvSpPr>
-            <a:spLocks noGrp="1"/>
-          </p:cNvSpPr>
-          <p:nvPr>
-            <p:ph type="title"/>
-          </p:nvPr>
-        </p:nvSpPr>
-        <p:spPr/>
-        <p:txBody>
-          <a:bodyPr/>
-          <a:lstStyle/>
-          <a:p>
-            <a:r>
-              <a:rPr lang="en-US" b="1" dirty="0">
-                <a:solidFill>
-                  <a:schemeClr val="accent4">
-                    <a:lumMod val="75000"/>
-                  </a:schemeClr>
-                </a:solidFill>
-                <a:latin typeface="Segoe UI Semilight" panose="020B0402040204020203" pitchFamily="34" charset="0"/>
-                <a:cs typeface="Segoe UI Semilight" panose="020B0402040204020203" pitchFamily="34" charset="0"/>
-              </a:rPr>
-              <a:t>W</a:t>
-            </a:r>
-            <a:r>
-              <a:rPr lang="en-US" dirty="0"/>
-              <a:t>eb</a:t>
-            </a:r>
-            <a:r>
-              <a:rPr lang="en-US" b="1" dirty="0">
-                <a:solidFill>
-                  <a:schemeClr val="tx2">
-                    <a:lumMod val="50000"/>
-                  </a:schemeClr>
-                </a:solidFill>
-                <a:latin typeface="Segoe UI Semilight" panose="020B0402040204020203" pitchFamily="34" charset="0"/>
-                <a:cs typeface="Segoe UI Semilight" panose="020B0402040204020203" pitchFamily="34" charset="0"/>
-              </a:rPr>
-              <a:t> </a:t>
-            </a:r>
-            <a:r>
-              <a:rPr lang="en-US" dirty="0"/>
-              <a:t>Services Introduction </a:t>
-            </a:r>
-          </a:p>
-        </p:txBody>
-      </p:sp>
-    </p:spTree>
-    <p:extLst>
-      <p:ext uri="{BB962C8B-B14F-4D97-AF65-F5344CB8AC3E}">
-        <p14:creationId xmlns:p14="http://schemas.microsoft.com/office/powerpoint/2010/main" val="2253637421"/>
-      </p:ext>
-    </p:extLst>
-  </p:cSld>
-  <p:clrMapOvr>
-    <a:masterClrMapping/>
-  </p:clrMapOvr>
-</p:sld>
-</file>
-
-<file path=ppt/slides/slide7.xml><?xml version="1.0" encoding="utf-8"?>
-<p:sld xmlns:a="http://schemas.openxmlformats.org/drawingml/2006/main" xmlns:r="http://schemas.openxmlformats.org/officeDocument/2006/relationships" xmlns:p="http://schemas.openxmlformats.org/presentationml/2006/main">
-  <p:cSld>
-    <p:spTree>
-      <p:nvGrpSpPr>
-        <p:cNvPr id="1" name=""/>
-        <p:cNvGrpSpPr/>
-        <p:nvPr/>
-      </p:nvGrpSpPr>
-      <p:grpSpPr>
-        <a:xfrm>
-          <a:off x="0" y="0"/>
-          <a:ext cx="0" cy="0"/>
-          <a:chOff x="0" y="0"/>
-          <a:chExt cx="0" cy="0"/>
-        </a:xfrm>
-      </p:grpSpPr>
-      <p:sp>
-        <p:nvSpPr>
-          <p:cNvPr id="2" name="Content Placeholder 1">
-            <a:extLst>
-              <a:ext uri="{FF2B5EF4-FFF2-40B4-BE49-F238E27FC236}">
                 <a16:creationId xmlns:a16="http://schemas.microsoft.com/office/drawing/2014/main" id="{2FA372DF-C909-2DAB-2A80-36D38A0F2F06}"/>
               </a:ext>
             </a:extLst>
@@ -11717,7 +11665,7 @@
 </p:sld>
 </file>
 
-<file path=ppt/slides/slide8.xml><?xml version="1.0" encoding="utf-8"?>
+<file path=ppt/slides/slide7.xml><?xml version="1.0" encoding="utf-8"?>
 <p:sld xmlns:a="http://schemas.openxmlformats.org/drawingml/2006/main" xmlns:r="http://schemas.openxmlformats.org/officeDocument/2006/relationships" xmlns:p="http://schemas.openxmlformats.org/presentationml/2006/main">
   <p:cSld>
     <p:spTree>
@@ -12075,6 +12023,300 @@
 </p:sld>
 </file>
 
+<file path=ppt/slides/slide8.xml><?xml version="1.0" encoding="utf-8"?>
+<p:sld xmlns:a="http://schemas.openxmlformats.org/drawingml/2006/main" xmlns:r="http://schemas.openxmlformats.org/officeDocument/2006/relationships" xmlns:p="http://schemas.openxmlformats.org/presentationml/2006/main">
+  <p:cSld>
+    <p:spTree>
+      <p:nvGrpSpPr>
+        <p:cNvPr id="1" name=""/>
+        <p:cNvGrpSpPr/>
+        <p:nvPr/>
+      </p:nvGrpSpPr>
+      <p:grpSpPr>
+        <a:xfrm>
+          <a:off x="0" y="0"/>
+          <a:ext cx="0" cy="0"/>
+          <a:chOff x="0" y="0"/>
+          <a:chExt cx="0" cy="0"/>
+        </a:xfrm>
+      </p:grpSpPr>
+      <p:sp>
+        <p:nvSpPr>
+          <p:cNvPr id="2" name="Content Placeholder 1">
+            <a:extLst>
+              <a:ext uri="{FF2B5EF4-FFF2-40B4-BE49-F238E27FC236}">
+                <a16:creationId xmlns:a16="http://schemas.microsoft.com/office/drawing/2014/main" id="{2CBA001D-BED3-B093-7D85-9099C53FC997}"/>
+              </a:ext>
+            </a:extLst>
+          </p:cNvPr>
+          <p:cNvSpPr>
+            <a:spLocks noGrp="1"/>
+          </p:cNvSpPr>
+          <p:nvPr>
+            <p:ph idx="1"/>
+          </p:nvPr>
+        </p:nvSpPr>
+        <p:spPr/>
+        <p:txBody>
+          <a:bodyPr/>
+          <a:lstStyle/>
+          <a:p>
+            <a:pPr algn="l" fontAlgn="base">
+              <a:buFont typeface="Wingdings" panose="05000000000000000000" pitchFamily="2" charset="2"/>
+              <a:buChar char="q"/>
+            </a:pPr>
+            <a:r>
+              <a:rPr lang="en-US" sz="1500" dirty="0"/>
+              <a:t>The bindings for the component can be defined in both the service and the reference:</a:t>
+            </a:r>
+          </a:p>
+          <a:p>
+            <a:pPr lvl="1" fontAlgn="base">
+              <a:buFont typeface="Arial" panose="020B0604020202020204" pitchFamily="34" charset="0"/>
+              <a:buChar char="•"/>
+            </a:pPr>
+            <a:r>
+              <a:rPr lang="en-US" b="0" i="0" dirty="0">
+                <a:solidFill>
+                  <a:schemeClr val="accent3">
+                    <a:lumMod val="75000"/>
+                  </a:schemeClr>
+                </a:solidFill>
+                <a:effectLst/>
+                <a:latin typeface="inherit"/>
+              </a:rPr>
+              <a:t>Component services </a:t>
+            </a:r>
+            <a:r>
+              <a:rPr lang="en-US" b="0" i="0" dirty="0">
+                <a:solidFill>
+                  <a:srgbClr val="161616"/>
+                </a:solidFill>
+                <a:effectLst/>
+                <a:latin typeface="inherit"/>
+              </a:rPr>
+              <a:t>use bindings to describe the access mechanism that other internal components have to use to call the component.</a:t>
+            </a:r>
+          </a:p>
+          <a:p>
+            <a:pPr lvl="1" fontAlgn="base">
+              <a:buFont typeface="Arial" panose="020B0604020202020204" pitchFamily="34" charset="0"/>
+              <a:buChar char="•"/>
+            </a:pPr>
+            <a:r>
+              <a:rPr lang="en-US" b="0" i="0" dirty="0">
+                <a:solidFill>
+                  <a:schemeClr val="accent3">
+                    <a:lumMod val="75000"/>
+                  </a:schemeClr>
+                </a:solidFill>
+                <a:effectLst/>
+                <a:latin typeface="inherit"/>
+              </a:rPr>
+              <a:t>Component references </a:t>
+            </a:r>
+            <a:r>
+              <a:rPr lang="en-US" b="0" i="0" dirty="0">
+                <a:solidFill>
+                  <a:srgbClr val="161616"/>
+                </a:solidFill>
+                <a:effectLst/>
+                <a:latin typeface="inherit"/>
+              </a:rPr>
+              <a:t>use bindings to describe the access mechanism that is used to call other components.</a:t>
+            </a:r>
+          </a:p>
+          <a:p>
+            <a:pPr lvl="1" fontAlgn="base">
+              <a:buFont typeface="Arial" panose="020B0604020202020204" pitchFamily="34" charset="0"/>
+              <a:buChar char="•"/>
+            </a:pPr>
+            <a:endParaRPr lang="en-US" b="0" i="0" dirty="0">
+              <a:solidFill>
+                <a:srgbClr val="161616"/>
+              </a:solidFill>
+              <a:effectLst/>
+              <a:latin typeface="inherit"/>
+            </a:endParaRPr>
+          </a:p>
+          <a:p>
+            <a:pPr fontAlgn="base">
+              <a:buFont typeface="Wingdings" panose="05000000000000000000" pitchFamily="2" charset="2"/>
+              <a:buChar char="q"/>
+            </a:pPr>
+            <a:r>
+              <a:rPr lang="en-US" sz="1500" dirty="0"/>
+              <a:t>Component services and references are internal and are used only for component-to-component communication. </a:t>
+            </a:r>
+          </a:p>
+          <a:p>
+            <a:pPr fontAlgn="base">
+              <a:buFont typeface="Wingdings" panose="05000000000000000000" pitchFamily="2" charset="2"/>
+              <a:buChar char="q"/>
+            </a:pPr>
+            <a:endParaRPr lang="en-US" sz="1500" dirty="0"/>
+          </a:p>
+          <a:p>
+            <a:pPr fontAlgn="base">
+              <a:buFont typeface="Wingdings" panose="05000000000000000000" pitchFamily="2" charset="2"/>
+              <a:buChar char="q"/>
+            </a:pPr>
+            <a:r>
+              <a:rPr lang="en-US" sz="1500" dirty="0"/>
+              <a:t>To create an external interface, the component must be deployed inside a composite.</a:t>
+            </a:r>
+          </a:p>
+          <a:p>
+            <a:pPr lvl="1" fontAlgn="base">
+              <a:buFont typeface="Wingdings" panose="05000000000000000000" pitchFamily="2" charset="2"/>
+              <a:buChar char="q"/>
+            </a:pPr>
+            <a:endParaRPr lang="en-US" dirty="0"/>
+          </a:p>
+          <a:p>
+            <a:pPr>
+              <a:buFont typeface="Wingdings" panose="05000000000000000000" pitchFamily="2" charset="2"/>
+              <a:buChar char="q"/>
+            </a:pPr>
+            <a:r>
+              <a:rPr lang="en-US" sz="1500" dirty="0"/>
+              <a:t> A very simple composite has one external service and one external reference:</a:t>
+            </a:r>
+          </a:p>
+          <a:p>
+            <a:pPr lvl="1" fontAlgn="base">
+              <a:buFont typeface="Arial" panose="020B0604020202020204" pitchFamily="34" charset="0"/>
+              <a:buChar char="•"/>
+            </a:pPr>
+            <a:r>
+              <a:rPr lang="en-US" dirty="0">
+                <a:solidFill>
+                  <a:schemeClr val="accent3">
+                    <a:lumMod val="75000"/>
+                  </a:schemeClr>
+                </a:solidFill>
+                <a:latin typeface="inherit"/>
+              </a:rPr>
+              <a:t>Composite services </a:t>
+            </a:r>
+            <a:r>
+              <a:rPr lang="en-US" dirty="0">
+                <a:solidFill>
+                  <a:srgbClr val="161616"/>
+                </a:solidFill>
+                <a:latin typeface="inherit"/>
+              </a:rPr>
+              <a:t>use bindings to describe the access mechanism that external clients must use to call the service</a:t>
+            </a:r>
+          </a:p>
+          <a:p>
+            <a:pPr lvl="1" fontAlgn="base">
+              <a:buFont typeface="Arial" panose="020B0604020202020204" pitchFamily="34" charset="0"/>
+              <a:buChar char="•"/>
+            </a:pPr>
+            <a:r>
+              <a:rPr lang="en-US" dirty="0">
+                <a:solidFill>
+                  <a:schemeClr val="accent3">
+                    <a:lumMod val="75000"/>
+                  </a:schemeClr>
+                </a:solidFill>
+                <a:latin typeface="inherit"/>
+              </a:rPr>
+              <a:t>Composite references </a:t>
+            </a:r>
+            <a:r>
+              <a:rPr lang="en-US" b="0" i="0" dirty="0">
+                <a:solidFill>
+                  <a:srgbClr val="161616"/>
+                </a:solidFill>
+                <a:effectLst/>
+                <a:latin typeface="inherit"/>
+              </a:rPr>
+              <a:t>use bindings to describe the access mechanism that is used to call another service.</a:t>
+            </a:r>
+          </a:p>
+          <a:p>
+            <a:pPr lvl="1" fontAlgn="base">
+              <a:buFont typeface="Arial" panose="020B0604020202020204" pitchFamily="34" charset="0"/>
+              <a:buChar char="•"/>
+            </a:pPr>
+            <a:endParaRPr lang="en-US" dirty="0">
+              <a:solidFill>
+                <a:srgbClr val="161616"/>
+              </a:solidFill>
+              <a:latin typeface="inherit"/>
+            </a:endParaRPr>
+          </a:p>
+        </p:txBody>
+      </p:sp>
+      <p:sp>
+        <p:nvSpPr>
+          <p:cNvPr id="3" name="Title 2">
+            <a:extLst>
+              <a:ext uri="{FF2B5EF4-FFF2-40B4-BE49-F238E27FC236}">
+                <a16:creationId xmlns:a16="http://schemas.microsoft.com/office/drawing/2014/main" id="{DD51C760-2776-4058-9496-1221ACDDC3B2}"/>
+              </a:ext>
+            </a:extLst>
+          </p:cNvPr>
+          <p:cNvSpPr>
+            <a:spLocks noGrp="1"/>
+          </p:cNvSpPr>
+          <p:nvPr>
+            <p:ph type="title"/>
+          </p:nvPr>
+        </p:nvSpPr>
+        <p:spPr/>
+        <p:txBody>
+          <a:bodyPr/>
+          <a:lstStyle/>
+          <a:p>
+            <a:r>
+              <a:rPr lang="en-US" b="1" dirty="0">
+                <a:solidFill>
+                  <a:srgbClr val="92D050"/>
+                </a:solidFill>
+                <a:latin typeface="Segoe UI Semilight" panose="020B0402040204020203" pitchFamily="34" charset="0"/>
+                <a:cs typeface="Segoe UI Semilight" panose="020B0402040204020203" pitchFamily="34" charset="0"/>
+              </a:rPr>
+              <a:t>S</a:t>
+            </a:r>
+            <a:r>
+              <a:rPr lang="en-US" dirty="0"/>
+              <a:t>ervice</a:t>
+            </a:r>
+            <a:r>
+              <a:rPr lang="en-US" b="1" dirty="0">
+                <a:solidFill>
+                  <a:schemeClr val="tx2">
+                    <a:lumMod val="50000"/>
+                  </a:schemeClr>
+                </a:solidFill>
+                <a:latin typeface="Segoe UI Semilight" panose="020B0402040204020203" pitchFamily="34" charset="0"/>
+                <a:cs typeface="Segoe UI Semilight" panose="020B0402040204020203" pitchFamily="34" charset="0"/>
+              </a:rPr>
+              <a:t> </a:t>
+            </a:r>
+            <a:r>
+              <a:rPr lang="en-US" dirty="0"/>
+              <a:t>Component Architecture (SCA)</a:t>
+            </a:r>
+          </a:p>
+        </p:txBody>
+      </p:sp>
+    </p:spTree>
+    <p:extLst>
+      <p:ext uri="{BB962C8B-B14F-4D97-AF65-F5344CB8AC3E}">
+        <p14:creationId xmlns:p14="http://schemas.microsoft.com/office/powerpoint/2010/main" val="878810253"/>
+      </p:ext>
+    </p:extLst>
+  </p:cSld>
+  <p:clrMapOvr>
+    <a:masterClrMapping/>
+  </p:clrMapOvr>
+</p:sld>
+</file>
+
 <file path=ppt/slides/slide9.xml><?xml version="1.0" encoding="utf-8"?>
 <p:sld xmlns:a="http://schemas.openxmlformats.org/drawingml/2006/main" xmlns:r="http://schemas.openxmlformats.org/officeDocument/2006/relationships" xmlns:p="http://schemas.openxmlformats.org/presentationml/2006/main">
   <p:cSld>
@@ -12097,7 +12339,7 @@
           <p:cNvPr id="2" name="Content Placeholder 1">
             <a:extLst>
               <a:ext uri="{FF2B5EF4-FFF2-40B4-BE49-F238E27FC236}">
-                <a16:creationId xmlns:a16="http://schemas.microsoft.com/office/drawing/2014/main" id="{2CBA001D-BED3-B093-7D85-9099C53FC997}"/>
+                <a16:creationId xmlns:a16="http://schemas.microsoft.com/office/drawing/2014/main" id="{0542E5A1-B286-C08A-948F-EAEE7AC71D38}"/>
               </a:ext>
             </a:extLst>
           </p:cNvPr>
@@ -12113,193 +12355,144 @@
           <a:bodyPr/>
           <a:lstStyle/>
           <a:p>
-            <a:pPr algn="l" fontAlgn="base">
-              <a:buFont typeface="Wingdings" panose="05000000000000000000" pitchFamily="2" charset="2"/>
-              <a:buChar char="q"/>
-            </a:pPr>
-            <a:r>
-              <a:rPr lang="en-US" sz="1500" dirty="0"/>
-              <a:t>The bindings for the component can be defined in both the service and the reference:</a:t>
-            </a:r>
-          </a:p>
-          <a:p>
-            <a:pPr lvl="1" fontAlgn="base">
-              <a:buFont typeface="Arial" panose="020B0604020202020204" pitchFamily="34" charset="0"/>
-              <a:buChar char="•"/>
-            </a:pPr>
-            <a:r>
-              <a:rPr lang="en-US" b="0" i="0" dirty="0">
-                <a:solidFill>
-                  <a:schemeClr val="accent3">
-                    <a:lumMod val="75000"/>
-                  </a:schemeClr>
-                </a:solidFill>
-                <a:effectLst/>
-                <a:latin typeface="inherit"/>
-              </a:rPr>
-              <a:t>Component services </a:t>
-            </a:r>
-            <a:r>
-              <a:rPr lang="en-US" b="0" i="0" dirty="0">
-                <a:solidFill>
-                  <a:srgbClr val="161616"/>
-                </a:solidFill>
-                <a:effectLst/>
-                <a:latin typeface="inherit"/>
-              </a:rPr>
-              <a:t>use bindings to describe the access mechanism that other internal components have to use to call the component.</a:t>
-            </a:r>
-          </a:p>
-          <a:p>
-            <a:pPr lvl="1" fontAlgn="base">
-              <a:buFont typeface="Arial" panose="020B0604020202020204" pitchFamily="34" charset="0"/>
-              <a:buChar char="•"/>
-            </a:pPr>
-            <a:r>
-              <a:rPr lang="en-US" b="0" i="0" dirty="0">
-                <a:solidFill>
-                  <a:schemeClr val="accent3">
-                    <a:lumMod val="75000"/>
-                  </a:schemeClr>
-                </a:solidFill>
-                <a:effectLst/>
-                <a:latin typeface="inherit"/>
-              </a:rPr>
-              <a:t>Component references </a:t>
-            </a:r>
-            <a:r>
-              <a:rPr lang="en-US" b="0" i="0" dirty="0">
-                <a:solidFill>
-                  <a:srgbClr val="161616"/>
-                </a:solidFill>
-                <a:effectLst/>
-                <a:latin typeface="inherit"/>
-              </a:rPr>
-              <a:t>use bindings to describe the access mechanism that is used to call other components.</a:t>
-            </a:r>
-          </a:p>
-          <a:p>
-            <a:pPr lvl="1" fontAlgn="base">
-              <a:buFont typeface="Arial" panose="020B0604020202020204" pitchFamily="34" charset="0"/>
-              <a:buChar char="•"/>
-            </a:pPr>
-            <a:endParaRPr lang="en-US" b="0" i="0" dirty="0">
-              <a:solidFill>
-                <a:srgbClr val="161616"/>
-              </a:solidFill>
-              <a:effectLst/>
-              <a:latin typeface="inherit"/>
-            </a:endParaRPr>
-          </a:p>
-          <a:p>
-            <a:pPr fontAlgn="base">
-              <a:buFont typeface="Wingdings" panose="05000000000000000000" pitchFamily="2" charset="2"/>
-              <a:buChar char="q"/>
-            </a:pPr>
-            <a:r>
-              <a:rPr lang="en-US" sz="1500" dirty="0"/>
-              <a:t>Component services and references are internal and are used only for component-to-component communication. </a:t>
-            </a:r>
-          </a:p>
-          <a:p>
-            <a:pPr fontAlgn="base">
-              <a:buFont typeface="Wingdings" panose="05000000000000000000" pitchFamily="2" charset="2"/>
-              <a:buChar char="q"/>
-            </a:pPr>
-            <a:endParaRPr lang="en-US" sz="1500" dirty="0"/>
-          </a:p>
-          <a:p>
-            <a:pPr fontAlgn="base">
-              <a:buFont typeface="Wingdings" panose="05000000000000000000" pitchFamily="2" charset="2"/>
-              <a:buChar char="q"/>
-            </a:pPr>
-            <a:r>
-              <a:rPr lang="en-US" sz="1500" dirty="0"/>
-              <a:t>To create an external interface, the component must be deployed inside a composite.</a:t>
-            </a:r>
-          </a:p>
-          <a:p>
-            <a:pPr lvl="1" fontAlgn="base">
-              <a:buFont typeface="Wingdings" panose="05000000000000000000" pitchFamily="2" charset="2"/>
-              <a:buChar char="q"/>
-            </a:pPr>
-            <a:endParaRPr lang="en-US" dirty="0"/>
-          </a:p>
-          <a:p>
             <a:pPr>
               <a:buFont typeface="Wingdings" panose="05000000000000000000" pitchFamily="2" charset="2"/>
               <a:buChar char="q"/>
             </a:pPr>
             <a:r>
-              <a:rPr lang="en-US" sz="1500" dirty="0"/>
-              <a:t> A very simple composite has one external service and one external reference:</a:t>
-            </a:r>
-          </a:p>
-          <a:p>
-            <a:pPr lvl="1" fontAlgn="base">
+              <a:rPr lang="en-US" dirty="0"/>
+              <a:t>ORACLE SOA SCA</a:t>
+            </a:r>
+          </a:p>
+          <a:p>
+            <a:pPr marL="0" indent="0">
+              <a:buNone/>
+            </a:pPr>
+            <a:endParaRPr lang="en-US" sz="1100" dirty="0"/>
+          </a:p>
+          <a:p>
+            <a:pPr lvl="1">
               <a:buFont typeface="Arial" panose="020B0604020202020204" pitchFamily="34" charset="0"/>
               <a:buChar char="•"/>
             </a:pPr>
             <a:r>
-              <a:rPr lang="en-US" dirty="0">
-                <a:solidFill>
-                  <a:schemeClr val="accent3">
-                    <a:lumMod val="75000"/>
-                  </a:schemeClr>
+              <a:rPr lang="en-US" sz="1400" dirty="0">
+                <a:solidFill>
+                  <a:srgbClr val="161616"/>
                 </a:solidFill>
                 <a:latin typeface="inherit"/>
               </a:rPr>
-              <a:t>Composite services </a:t>
-            </a:r>
-            <a:r>
-              <a:rPr lang="en-US" dirty="0">
+              <a:t>The entry point to the composite itself is the </a:t>
+            </a:r>
+            <a:r>
+              <a:rPr lang="en-US" sz="1400" dirty="0">
+                <a:solidFill>
+                  <a:srgbClr val="00B050"/>
+                </a:solidFill>
+                <a:latin typeface="inherit"/>
+              </a:rPr>
+              <a:t>Service</a:t>
+            </a:r>
+            <a:r>
+              <a:rPr lang="en-US" sz="1400" dirty="0">
                 <a:solidFill>
                   <a:srgbClr val="161616"/>
                 </a:solidFill>
                 <a:latin typeface="inherit"/>
               </a:rPr>
-              <a:t>use bindings to describe the access mechanism that external clients must use to call the service</a:t>
-            </a:r>
-          </a:p>
-          <a:p>
-            <a:pPr lvl="1" fontAlgn="base">
+              <a:t> which exposes a chain of one or more components (each with its own Service interface) that are bound/linked together as dependencies (known as </a:t>
+            </a:r>
+            <a:r>
+              <a:rPr lang="en-US" sz="1400" dirty="0">
+                <a:solidFill>
+                  <a:srgbClr val="00B050"/>
+                </a:solidFill>
+                <a:latin typeface="inherit"/>
+              </a:rPr>
+              <a:t>References</a:t>
+            </a:r>
+            <a:r>
+              <a:rPr lang="en-US" sz="1400" dirty="0">
+                <a:solidFill>
+                  <a:srgbClr val="161616"/>
+                </a:solidFill>
+                <a:latin typeface="inherit"/>
+              </a:rPr>
+              <a:t>) through </a:t>
+            </a:r>
+            <a:r>
+              <a:rPr lang="en-US" sz="1400" dirty="0">
+                <a:solidFill>
+                  <a:srgbClr val="00B050"/>
+                </a:solidFill>
+                <a:latin typeface="inherit"/>
+              </a:rPr>
+              <a:t>Wires</a:t>
+            </a:r>
+            <a:r>
+              <a:rPr lang="en-US" sz="1400" dirty="0">
+                <a:solidFill>
+                  <a:srgbClr val="161616"/>
+                </a:solidFill>
+                <a:latin typeface="inherit"/>
+              </a:rPr>
+              <a:t>. </a:t>
+            </a:r>
+          </a:p>
+          <a:p>
+            <a:pPr lvl="1">
               <a:buFont typeface="Arial" panose="020B0604020202020204" pitchFamily="34" charset="0"/>
               <a:buChar char="•"/>
             </a:pPr>
             <a:r>
-              <a:rPr lang="en-US" dirty="0">
-                <a:solidFill>
-                  <a:schemeClr val="accent3">
-                    <a:lumMod val="75000"/>
-                  </a:schemeClr>
+              <a:rPr lang="en-US" sz="1400" dirty="0">
+                <a:solidFill>
+                  <a:srgbClr val="161616"/>
                 </a:solidFill>
                 <a:latin typeface="inherit"/>
               </a:rPr>
-              <a:t>Composite references </a:t>
-            </a:r>
-            <a:r>
-              <a:rPr lang="en-US" b="0" i="0" dirty="0">
-                <a:solidFill>
-                  <a:srgbClr val="161616"/>
-                </a:solidFill>
-                <a:effectLst/>
-                <a:latin typeface="inherit"/>
-              </a:rPr>
-              <a:t>use bindings to describe the access mechanism that is used to call another service.</a:t>
-            </a:r>
-          </a:p>
-          <a:p>
-            <a:pPr lvl="1" fontAlgn="base">
+              <a:t>The components can be local (such as a BPEL process or JCA adapter) or they can be remote using a protocol such as Web services. </a:t>
+            </a:r>
+          </a:p>
+          <a:p>
+            <a:pPr lvl="1">
               <a:buFont typeface="Arial" panose="020B0604020202020204" pitchFamily="34" charset="0"/>
               <a:buChar char="•"/>
             </a:pPr>
-            <a:endParaRPr lang="en-US" dirty="0">
+            <a:r>
+              <a:rPr lang="en-US" sz="1400" dirty="0">
+                <a:solidFill>
+                  <a:srgbClr val="161616"/>
+                </a:solidFill>
+                <a:latin typeface="inherit"/>
+              </a:rPr>
+              <a:t>Finally, the specification allows for each of the components to have properties for customization within a particular use or deployment (e.g. the directory to which a completed Purchase Order document should be written).</a:t>
+            </a:r>
+          </a:p>
+          <a:p>
+            <a:pPr lvl="1">
+              <a:buFont typeface="Arial" panose="020B0604020202020204" pitchFamily="34" charset="0"/>
+              <a:buChar char="•"/>
+            </a:pPr>
+            <a:endParaRPr lang="en-US" sz="1400" dirty="0">
               <a:solidFill>
                 <a:srgbClr val="161616"/>
               </a:solidFill>
               <a:latin typeface="inherit"/>
             </a:endParaRPr>
           </a:p>
+          <a:p>
+            <a:pPr lvl="1">
+              <a:buFont typeface="Arial" panose="020B0604020202020204" pitchFamily="34" charset="0"/>
+              <a:buChar char="•"/>
+            </a:pPr>
+            <a:endParaRPr lang="en-US" sz="1400" dirty="0">
+              <a:solidFill>
+                <a:srgbClr val="161616"/>
+              </a:solidFill>
+              <a:latin typeface="inherit"/>
+            </a:endParaRPr>
+          </a:p>
         </p:txBody>
       </p:sp>
       <p:sp>
@@ -12307,7 +12500,7 @@
           <p:cNvPr id="3" name="Title 2">
             <a:extLst>
               <a:ext uri="{FF2B5EF4-FFF2-40B4-BE49-F238E27FC236}">
-                <a16:creationId xmlns:a16="http://schemas.microsoft.com/office/drawing/2014/main" id="{DD51C760-2776-4058-9496-1221ACDDC3B2}"/>
+                <a16:creationId xmlns:a16="http://schemas.microsoft.com/office/drawing/2014/main" id="{4C026758-6EB5-2BD2-2F2E-6132759AA3B5}"/>
               </a:ext>
             </a:extLst>
           </p:cNvPr>
@@ -12356,10 +12549,70 @@
           </a:p>
         </p:txBody>
       </p:sp>
+      <p:pic>
+        <p:nvPicPr>
+          <p:cNvPr id="5" name="Picture 4">
+            <a:extLst>
+              <a:ext uri="{FF2B5EF4-FFF2-40B4-BE49-F238E27FC236}">
+                <a16:creationId xmlns:a16="http://schemas.microsoft.com/office/drawing/2014/main" id="{A0E7569D-F024-74C0-6C41-D880A6C2907A}"/>
+              </a:ext>
+            </a:extLst>
+          </p:cNvPr>
+          <p:cNvPicPr>
+            <a:picLocks noChangeAspect="1"/>
+          </p:cNvPicPr>
+          <p:nvPr/>
+        </p:nvPicPr>
+        <p:blipFill>
+          <a:blip r:embed="rId2"/>
+          <a:stretch>
+            <a:fillRect/>
+          </a:stretch>
+        </p:blipFill>
+        <p:spPr>
+          <a:xfrm>
+            <a:off x="625816" y="3672686"/>
+            <a:ext cx="3279134" cy="2422954"/>
+          </a:xfrm>
+          <a:prstGeom prst="rect">
+            <a:avLst/>
+          </a:prstGeom>
+        </p:spPr>
+      </p:pic>
+      <p:pic>
+        <p:nvPicPr>
+          <p:cNvPr id="7" name="Picture 6">
+            <a:extLst>
+              <a:ext uri="{FF2B5EF4-FFF2-40B4-BE49-F238E27FC236}">
+                <a16:creationId xmlns:a16="http://schemas.microsoft.com/office/drawing/2014/main" id="{B88A8CE2-46E4-C98C-A654-B6D4CAD56CF9}"/>
+              </a:ext>
+            </a:extLst>
+          </p:cNvPr>
+          <p:cNvPicPr>
+            <a:picLocks noChangeAspect="1"/>
+          </p:cNvPicPr>
+          <p:nvPr/>
+        </p:nvPicPr>
+        <p:blipFill>
+          <a:blip r:embed="rId3"/>
+          <a:stretch>
+            <a:fillRect/>
+          </a:stretch>
+        </p:blipFill>
+        <p:spPr>
+          <a:xfrm>
+            <a:off x="4073566" y="4013961"/>
+            <a:ext cx="4396487" cy="1740403"/>
+          </a:xfrm>
+          <a:prstGeom prst="rect">
+            <a:avLst/>
+          </a:prstGeom>
+        </p:spPr>
+      </p:pic>
     </p:spTree>
     <p:extLst>
       <p:ext uri="{BB962C8B-B14F-4D97-AF65-F5344CB8AC3E}">
-        <p14:creationId xmlns:p14="http://schemas.microsoft.com/office/powerpoint/2010/main" val="878810253"/>
+        <p14:creationId xmlns:p14="http://schemas.microsoft.com/office/powerpoint/2010/main" val="3505989978"/>
       </p:ext>
     </p:extLst>
   </p:cSld>

</xml_diff>

<commit_message>
End of 5th Session
</commit_message>
<xml_diff>
--- a/Presentation/soaTrainingPresentation.pptx
+++ b/Presentation/soaTrainingPresentation.pptx
@@ -3744,7 +3744,7 @@
         </p:nvSpPr>
         <p:spPr>
           <a:xfrm>
-            <a:off x="457200" y="1262743"/>
+            <a:off x="251012" y="1343426"/>
             <a:ext cx="8229600" cy="2989280"/>
           </a:xfrm>
           <a:prstGeom prst="rect">
@@ -9361,26 +9361,7 @@
                   </a:extLst>
                 </a:hlinkClick>
               </a:rPr>
-              <a:t>computer </a:t>
-            </a:r>
-            <a:r>
-              <a:rPr lang="en-US" sz="1500" dirty="0" err="1">
-                <a:solidFill>
-                  <a:schemeClr val="tx2">
-                    <a:lumMod val="60000"/>
-                    <a:lumOff val="40000"/>
-                  </a:schemeClr>
-                </a:solidFill>
-                <a:latin typeface="Trebuchet MS" pitchFamily="34" charset="0"/>
-                <a:hlinkClick r:id="rId4" tooltip="Computer architecture">
-                  <a:extLst>
-                    <a:ext uri="{A12FA001-AC4F-418D-AE19-62706E023703}">
-                      <ahyp:hlinkClr xmlns:ahyp="http://schemas.microsoft.com/office/drawing/2018/hyperlinkcolor" val="tx"/>
-                    </a:ext>
-                  </a:extLst>
-                </a:hlinkClick>
-              </a:rPr>
-              <a:t>hardwarearchitecture</a:t>
+              <a:t>computer hardware architecture</a:t>
             </a:r>
             <a:r>
               <a:rPr lang="en-US" sz="1500" dirty="0">

</xml_diff>